<commit_message>
Updated AGU slides to reflect comments
</commit_message>
<xml_diff>
--- a/UVM-NRT-RoS/AGU Slides-ROS Events and Precip Phase Partitioning.pptx
+++ b/UVM-NRT-RoS/AGU Slides-ROS Events and Precip Phase Partitioning.pptx
@@ -5,7 +5,7 @@
     <p:sldMasterId id="2147483648" r:id="rId4"/>
   </p:sldMasterIdLst>
   <p:notesMasterIdLst>
-    <p:notesMasterId r:id="rId14"/>
+    <p:notesMasterId r:id="rId16"/>
   </p:notesMasterIdLst>
   <p:sldIdLst>
     <p:sldId id="257" r:id="rId5"/>
@@ -17,21 +17,23 @@
     <p:sldId id="290" r:id="rId11"/>
     <p:sldId id="291" r:id="rId12"/>
     <p:sldId id="292" r:id="rId13"/>
+    <p:sldId id="293" r:id="rId14"/>
+    <p:sldId id="294" r:id="rId15"/>
   </p:sldIdLst>
   <p:sldSz cx="12192000" cy="6858000"/>
   <p:notesSz cx="6858000" cy="9144000"/>
   <p:embeddedFontLst>
     <p:embeddedFont>
       <p:font typeface="Century Gothic" panose="020B0502020202020204" pitchFamily="34" charset="0"/>
-      <p:regular r:id="rId15"/>
-      <p:bold r:id="rId16"/>
-      <p:italic r:id="rId17"/>
-      <p:boldItalic r:id="rId18"/>
+      <p:regular r:id="rId17"/>
+      <p:bold r:id="rId18"/>
+      <p:italic r:id="rId19"/>
+      <p:boldItalic r:id="rId20"/>
     </p:embeddedFont>
     <p:embeddedFont>
-      <p:font typeface="Poppins Medium" panose="020B0604020202020204" pitchFamily="34" charset="0"/>
-      <p:regular r:id="rId19"/>
-      <p:italic r:id="rId20"/>
+      <p:font typeface="Poppins Medium" panose="00000600000000000000" pitchFamily="2" charset="0"/>
+      <p:regular r:id="rId21"/>
+      <p:italic r:id="rId22"/>
     </p:embeddedFont>
   </p:embeddedFontLst>
   <p:defaultTextStyle>
@@ -230,7 +232,7 @@
           <a:p>
             <a:fld id="{9EDFEC3F-CA95-774B-A084-8513D32CF312}" type="datetimeFigureOut">
               <a:rPr lang="en-US" smtClean="0"/>
-              <a:t>12/2/24</a:t>
+              <a:t>12/3/2024</a:t>
             </a:fld>
             <a:endParaRPr lang="en-US"/>
           </a:p>
@@ -19709,6 +19711,335 @@
 </p:sld>
 </file>
 
+<file path=ppt/slides/slide10.xml><?xml version="1.0" encoding="utf-8"?>
+<p:sld xmlns:a="http://schemas.openxmlformats.org/drawingml/2006/main" xmlns:r="http://schemas.openxmlformats.org/officeDocument/2006/relationships" xmlns:p="http://schemas.openxmlformats.org/presentationml/2006/main">
+  <p:cSld>
+    <p:spTree>
+      <p:nvGrpSpPr>
+        <p:cNvPr id="1" name=""/>
+        <p:cNvGrpSpPr/>
+        <p:nvPr/>
+      </p:nvGrpSpPr>
+      <p:grpSpPr>
+        <a:xfrm>
+          <a:off x="0" y="0"/>
+          <a:ext cx="0" cy="0"/>
+          <a:chOff x="0" y="0"/>
+          <a:chExt cx="0" cy="0"/>
+        </a:xfrm>
+      </p:grpSpPr>
+      <p:sp>
+        <p:nvSpPr>
+          <p:cNvPr id="2" name="Text Placeholder 1">
+            <a:extLst>
+              <a:ext uri="{FF2B5EF4-FFF2-40B4-BE49-F238E27FC236}">
+                <a16:creationId xmlns:a16="http://schemas.microsoft.com/office/drawing/2014/main" id="{D0FA9384-4A17-C8FD-B9D1-DD9B98E6020A}"/>
+              </a:ext>
+            </a:extLst>
+          </p:cNvPr>
+          <p:cNvSpPr>
+            <a:spLocks noGrp="1"/>
+          </p:cNvSpPr>
+          <p:nvPr>
+            <p:ph type="body" sz="quarter" idx="13"/>
+          </p:nvPr>
+        </p:nvSpPr>
+        <p:spPr>
+          <a:xfrm>
+            <a:off x="614360" y="1158756"/>
+            <a:ext cx="11073073" cy="4656116"/>
+          </a:xfrm>
+        </p:spPr>
+        <p:txBody>
+          <a:bodyPr numCol="1">
+            <a:noAutofit/>
+          </a:bodyPr>
+          <a:lstStyle/>
+          <a:p>
+            <a:pPr marL="285750" indent="-285750">
+              <a:buFont typeface="Arial" panose="020B0604020202020204" pitchFamily="34" charset="0"/>
+              <a:buChar char="•"/>
+            </a:pPr>
+            <a:r>
+              <a:rPr lang="en-US" sz="1600" dirty="0"/>
+              <a:t>Temporal Features:</a:t>
+            </a:r>
+          </a:p>
+          <a:p>
+            <a:pPr marL="742950" lvl="1" indent="-285750">
+              <a:lnSpc>
+                <a:spcPct val="100000"/>
+              </a:lnSpc>
+              <a:buFont typeface="Arial" panose="020B0604020202020204" pitchFamily="34" charset="0"/>
+              <a:buChar char="•"/>
+            </a:pPr>
+            <a:r>
+              <a:rPr lang="en-US" sz="1600" dirty="0"/>
+              <a:t>Average Autocorrelation Coefficient*, Average Zero Crossing Rate*, Temporal Entropy, Acoustic Complexity Index</a:t>
+            </a:r>
+          </a:p>
+          <a:p>
+            <a:pPr marL="285750" indent="-285750">
+              <a:lnSpc>
+                <a:spcPct val="100000"/>
+              </a:lnSpc>
+              <a:buFont typeface="Arial" panose="020B0604020202020204" pitchFamily="34" charset="0"/>
+              <a:buChar char="•"/>
+            </a:pPr>
+            <a:r>
+              <a:rPr lang="en-US" sz="1600" dirty="0"/>
+              <a:t>Spectral Features: </a:t>
+            </a:r>
+          </a:p>
+          <a:p>
+            <a:pPr marL="742950" lvl="1" indent="-285750">
+              <a:lnSpc>
+                <a:spcPct val="100000"/>
+              </a:lnSpc>
+              <a:buFont typeface="Arial" panose="020B0604020202020204" pitchFamily="34" charset="0"/>
+              <a:buChar char="•"/>
+            </a:pPr>
+            <a:r>
+              <a:rPr lang="en-US" sz="1600" dirty="0"/>
+              <a:t>Spectral Entropy, Spectral Cover Low Frequency Coverage, Spectral Cover Mid Frequency Coverage, Spectral Cover High Frequency Coverage, Spectral Flux, Spectral Centroid, Spectral Spread, Spectral Skewness, Spectral Kurtosis, Spectral Bandwidth, Spectral Flatness, Spectral Rolloff</a:t>
+            </a:r>
+          </a:p>
+          <a:p>
+            <a:pPr marL="285750" indent="-285750">
+              <a:lnSpc>
+                <a:spcPct val="100000"/>
+              </a:lnSpc>
+              <a:buFont typeface="Arial" panose="020B0604020202020204" pitchFamily="34" charset="0"/>
+              <a:buChar char="•"/>
+            </a:pPr>
+            <a:r>
+              <a:rPr lang="en-US" sz="1600" dirty="0"/>
+              <a:t>MFCC Details:</a:t>
+            </a:r>
+          </a:p>
+          <a:p>
+            <a:pPr marL="742950" lvl="1" indent="-285750">
+              <a:lnSpc>
+                <a:spcPct val="100000"/>
+              </a:lnSpc>
+              <a:buFont typeface="Arial" panose="020B0604020202020204" pitchFamily="34" charset="0"/>
+              <a:buChar char="•"/>
+            </a:pPr>
+            <a:r>
+              <a:rPr lang="en-US" sz="1600" dirty="0"/>
+              <a:t>13 MFCC coefficients extracted</a:t>
+            </a:r>
+          </a:p>
+          <a:p>
+            <a:pPr marL="742950" lvl="1" indent="-285750">
+              <a:lnSpc>
+                <a:spcPct val="100000"/>
+              </a:lnSpc>
+              <a:buFont typeface="Arial" panose="020B0604020202020204" pitchFamily="34" charset="0"/>
+              <a:buChar char="•"/>
+            </a:pPr>
+            <a:r>
+              <a:rPr lang="en-US" sz="1600" dirty="0"/>
+              <a:t>When performing this in Librosa, a </a:t>
+            </a:r>
+            <a:r>
+              <a:rPr lang="en-US" sz="1600" dirty="0">
+                <a:highlight>
+                  <a:srgbClr val="00FFFF"/>
+                </a:highlight>
+              </a:rPr>
+              <a:t>windowing size </a:t>
+            </a:r>
+            <a:r>
+              <a:rPr lang="en-US" sz="1600" dirty="0"/>
+              <a:t>of 1024 was used</a:t>
+            </a:r>
+          </a:p>
+          <a:p>
+            <a:pPr marL="742950" lvl="1" indent="-285750">
+              <a:lnSpc>
+                <a:spcPct val="100000"/>
+              </a:lnSpc>
+              <a:buFont typeface="Arial" panose="020B0604020202020204" pitchFamily="34" charset="0"/>
+              <a:buChar char="•"/>
+            </a:pPr>
+            <a:r>
+              <a:rPr lang="en-US" sz="1600" dirty="0"/>
+              <a:t>When performing with our own function, a </a:t>
+            </a:r>
+            <a:r>
+              <a:rPr lang="en-US" sz="1600" dirty="0">
+                <a:highlight>
+                  <a:srgbClr val="00FFFF"/>
+                </a:highlight>
+              </a:rPr>
+              <a:t>windowing size </a:t>
+            </a:r>
+            <a:r>
+              <a:rPr lang="en-US" sz="1600" dirty="0"/>
+              <a:t>of 256 was used. </a:t>
+            </a:r>
+          </a:p>
+          <a:p>
+            <a:pPr marL="742950" lvl="1" indent="-285750">
+              <a:lnSpc>
+                <a:spcPct val="100000"/>
+              </a:lnSpc>
+              <a:buFont typeface="Arial" panose="020B0604020202020204" pitchFamily="34" charset="0"/>
+              <a:buChar char="•"/>
+            </a:pPr>
+            <a:endParaRPr lang="en-US" sz="1600" dirty="0"/>
+          </a:p>
+          <a:p>
+            <a:pPr marL="285750" indent="-285750">
+              <a:lnSpc>
+                <a:spcPct val="100000"/>
+              </a:lnSpc>
+              <a:buFont typeface="Arial" panose="020B0604020202020204" pitchFamily="34" charset="0"/>
+              <a:buChar char="•"/>
+            </a:pPr>
+            <a:r>
+              <a:rPr lang="en-US" sz="1600" dirty="0"/>
+              <a:t>*For some features, like Autocorrelation Coefficient, many values are outputted for each sample. To cut down on the number of features inputted to the model, we average these values together for each .</a:t>
+            </a:r>
+          </a:p>
+        </p:txBody>
+      </p:sp>
+      <p:sp>
+        <p:nvSpPr>
+          <p:cNvPr id="3" name="Title 2">
+            <a:extLst>
+              <a:ext uri="{FF2B5EF4-FFF2-40B4-BE49-F238E27FC236}">
+                <a16:creationId xmlns:a16="http://schemas.microsoft.com/office/drawing/2014/main" id="{41B05EE2-14D9-7F4A-6C37-8BED321ECD82}"/>
+              </a:ext>
+            </a:extLst>
+          </p:cNvPr>
+          <p:cNvSpPr>
+            <a:spLocks noGrp="1"/>
+          </p:cNvSpPr>
+          <p:nvPr>
+            <p:ph type="title"/>
+          </p:nvPr>
+        </p:nvSpPr>
+        <p:spPr>
+          <a:xfrm>
+            <a:off x="614360" y="380680"/>
+            <a:ext cx="11067003" cy="778075"/>
+          </a:xfrm>
+        </p:spPr>
+        <p:txBody>
+          <a:bodyPr/>
+          <a:lstStyle/>
+          <a:p>
+            <a:r>
+              <a:rPr lang="en-US" dirty="0"/>
+              <a:t>Features Extracted from Audio</a:t>
+            </a:r>
+          </a:p>
+        </p:txBody>
+      </p:sp>
+    </p:spTree>
+    <p:extLst>
+      <p:ext uri="{BB962C8B-B14F-4D97-AF65-F5344CB8AC3E}">
+        <p14:creationId xmlns:p14="http://schemas.microsoft.com/office/powerpoint/2010/main" val="851105471"/>
+      </p:ext>
+    </p:extLst>
+  </p:cSld>
+  <p:clrMapOvr>
+    <a:masterClrMapping/>
+  </p:clrMapOvr>
+</p:sld>
+</file>
+
+<file path=ppt/slides/slide11.xml><?xml version="1.0" encoding="utf-8"?>
+<p:sld xmlns:a="http://schemas.openxmlformats.org/drawingml/2006/main" xmlns:r="http://schemas.openxmlformats.org/officeDocument/2006/relationships" xmlns:p="http://schemas.openxmlformats.org/presentationml/2006/main">
+  <p:cSld>
+    <p:spTree>
+      <p:nvGrpSpPr>
+        <p:cNvPr id="1" name=""/>
+        <p:cNvGrpSpPr/>
+        <p:nvPr/>
+      </p:nvGrpSpPr>
+      <p:grpSpPr>
+        <a:xfrm>
+          <a:off x="0" y="0"/>
+          <a:ext cx="0" cy="0"/>
+          <a:chOff x="0" y="0"/>
+          <a:chExt cx="0" cy="0"/>
+        </a:xfrm>
+      </p:grpSpPr>
+      <p:sp>
+        <p:nvSpPr>
+          <p:cNvPr id="2" name="Text Placeholder 1">
+            <a:extLst>
+              <a:ext uri="{FF2B5EF4-FFF2-40B4-BE49-F238E27FC236}">
+                <a16:creationId xmlns:a16="http://schemas.microsoft.com/office/drawing/2014/main" id="{2239DD78-8CEE-F7A9-69AD-5BDCB7FF71F5}"/>
+              </a:ext>
+            </a:extLst>
+          </p:cNvPr>
+          <p:cNvSpPr>
+            <a:spLocks noGrp="1"/>
+          </p:cNvSpPr>
+          <p:nvPr>
+            <p:ph type="body" sz="quarter" idx="13"/>
+          </p:nvPr>
+        </p:nvSpPr>
+        <p:spPr/>
+        <p:txBody>
+          <a:bodyPr/>
+          <a:lstStyle/>
+          <a:p>
+            <a:r>
+              <a:rPr lang="en-US" dirty="0"/>
+              <a:t>Power and memory usage: Max ~30mA during prediction workflow, 16KB RAM. </a:t>
+            </a:r>
+          </a:p>
+          <a:p>
+            <a:endParaRPr lang="en-US" dirty="0"/>
+          </a:p>
+        </p:txBody>
+      </p:sp>
+      <p:sp>
+        <p:nvSpPr>
+          <p:cNvPr id="3" name="Title 2">
+            <a:extLst>
+              <a:ext uri="{FF2B5EF4-FFF2-40B4-BE49-F238E27FC236}">
+                <a16:creationId xmlns:a16="http://schemas.microsoft.com/office/drawing/2014/main" id="{721AB0E1-AC53-8093-1BE4-66300FFB9612}"/>
+              </a:ext>
+            </a:extLst>
+          </p:cNvPr>
+          <p:cNvSpPr>
+            <a:spLocks noGrp="1"/>
+          </p:cNvSpPr>
+          <p:nvPr>
+            <p:ph type="title"/>
+          </p:nvPr>
+        </p:nvSpPr>
+        <p:spPr/>
+        <p:txBody>
+          <a:bodyPr/>
+          <a:lstStyle/>
+          <a:p>
+            <a:r>
+              <a:rPr lang="en-US" dirty="0"/>
+              <a:t>To be added back in? (or removed)</a:t>
+            </a:r>
+          </a:p>
+        </p:txBody>
+      </p:sp>
+    </p:spTree>
+    <p:extLst>
+      <p:ext uri="{BB962C8B-B14F-4D97-AF65-F5344CB8AC3E}">
+        <p14:creationId xmlns:p14="http://schemas.microsoft.com/office/powerpoint/2010/main" val="1235237133"/>
+      </p:ext>
+    </p:extLst>
+  </p:cSld>
+  <p:clrMapOvr>
+    <a:masterClrMapping/>
+  </p:clrMapOvr>
+</p:sld>
+</file>
+
 <file path=ppt/slides/slide2.xml><?xml version="1.0" encoding="utf-8"?>
 <p:sld xmlns:a="http://schemas.openxmlformats.org/drawingml/2006/main" xmlns:r="http://schemas.openxmlformats.org/officeDocument/2006/relationships" xmlns:p="http://schemas.openxmlformats.org/presentationml/2006/main">
   <p:cSld>
@@ -22036,7 +22367,9 @@
         </p:nvSpPr>
         <p:spPr/>
         <p:txBody>
-          <a:bodyPr numCol="1"/>
+          <a:bodyPr numCol="1">
+            <a:normAutofit/>
+          </a:bodyPr>
           <a:lstStyle/>
           <a:p>
             <a:pPr marL="285750" indent="-285750">
@@ -22077,12 +22410,6 @@
               <a:rPr lang="en-US" dirty="0"/>
               <a:t>Current model results, on synthetic data, as follows (in percentages):</a:t>
             </a:r>
-          </a:p>
-          <a:p>
-            <a:endParaRPr lang="en-US" dirty="0"/>
-          </a:p>
-          <a:p>
-            <a:endParaRPr lang="en-US" dirty="0"/>
           </a:p>
           <a:p>
             <a:pPr marL="285750" indent="-285750">
@@ -22092,14 +22419,17 @@
             <a:endParaRPr lang="en-US" dirty="0"/>
           </a:p>
           <a:p>
+            <a:endParaRPr lang="en-US" dirty="0"/>
+          </a:p>
+          <a:p>
+            <a:endParaRPr lang="en-US" dirty="0"/>
+          </a:p>
+          <a:p>
             <a:pPr marL="285750" indent="-285750">
               <a:buFont typeface="Arial" panose="020B0604020202020204" pitchFamily="34" charset="0"/>
               <a:buChar char="•"/>
             </a:pPr>
-            <a:r>
-              <a:rPr lang="en-US" dirty="0"/>
-              <a:t>Power and memory usage: Max ~30mA during prediction workflow, 16KB RAM. </a:t>
-            </a:r>
+            <a:endParaRPr lang="en-US" dirty="0"/>
           </a:p>
           <a:p>
             <a:pPr marL="285750" indent="-285750">
@@ -22155,10 +22485,10 @@
       </p:sp>
       <p:pic>
         <p:nvPicPr>
-          <p:cNvPr id="4" name="Picture 3">
+          <p:cNvPr id="14" name="Picture 13">
             <a:extLst>
               <a:ext uri="{FF2B5EF4-FFF2-40B4-BE49-F238E27FC236}">
-                <a16:creationId xmlns:a16="http://schemas.microsoft.com/office/drawing/2014/main" id="{891BDF9E-863C-A95D-267C-4F62F6A24D8F}"/>
+                <a16:creationId xmlns:a16="http://schemas.microsoft.com/office/drawing/2014/main" id="{59BFC66D-E0E5-0FF1-D1A7-A2C2DA6267CC}"/>
               </a:ext>
             </a:extLst>
           </p:cNvPr>
@@ -22175,8 +22505,38 @@
         </p:blipFill>
         <p:spPr>
           <a:xfrm>
-            <a:off x="1114167" y="3429000"/>
-            <a:ext cx="12192000" cy="938877"/>
+            <a:off x="768607" y="3338321"/>
+            <a:ext cx="10156674" cy="1161290"/>
+          </a:xfrm>
+          <a:prstGeom prst="rect">
+            <a:avLst/>
+          </a:prstGeom>
+        </p:spPr>
+      </p:pic>
+      <p:pic>
+        <p:nvPicPr>
+          <p:cNvPr id="16" name="Picture 15">
+            <a:extLst>
+              <a:ext uri="{FF2B5EF4-FFF2-40B4-BE49-F238E27FC236}">
+                <a16:creationId xmlns:a16="http://schemas.microsoft.com/office/drawing/2014/main" id="{F15D4AC1-B1EB-376D-1C7A-E2F6587B3394}"/>
+              </a:ext>
+            </a:extLst>
+          </p:cNvPr>
+          <p:cNvPicPr>
+            <a:picLocks noChangeAspect="1"/>
+          </p:cNvPicPr>
+          <p:nvPr/>
+        </p:nvPicPr>
+        <p:blipFill>
+          <a:blip r:embed="rId3"/>
+          <a:stretch>
+            <a:fillRect/>
+          </a:stretch>
+        </p:blipFill>
+        <p:spPr>
+          <a:xfrm>
+            <a:off x="768607" y="4568694"/>
+            <a:ext cx="10156674" cy="976072"/>
           </a:xfrm>
           <a:prstGeom prst="rect">
             <a:avLst/>
@@ -27446,6 +27806,27 @@
 </file>
 
 <file path=customXml/item1.xml><?xml version="1.0" encoding="utf-8"?>
+<p:properties xmlns:p="http://schemas.microsoft.com/office/2006/metadata/properties" xmlns:xsi="http://www.w3.org/2001/XMLSchema-instance" xmlns:pc="http://schemas.microsoft.com/office/infopath/2007/PartnerControls">
+  <documentManagement>
+    <TaxCatchAll xmlns="fa2145f4-c689-44be-8a05-a20dc84ec0fc" xsi:nil="true"/>
+    <lcf76f155ced4ddcb4097134ff3c332f xmlns="938f2e1f-609f-4017-a9a2-d54cf4ee6b3b">
+      <Terms xmlns="http://schemas.microsoft.com/office/infopath/2007/PartnerControls"/>
+    </lcf76f155ced4ddcb4097134ff3c332f>
+    <Category xmlns="938f2e1f-609f-4017-a9a2-d54cf4ee6b3b" xsi:nil="true"/>
+  </documentManagement>
+</p:properties>
+</file>
+
+<file path=customXml/item2.xml><?xml version="1.0" encoding="utf-8"?>
+<?mso-contentType ?>
+<FormTemplates xmlns="http://schemas.microsoft.com/sharepoint/v3/contenttype/forms">
+  <Display>DocumentLibraryForm</Display>
+  <Edit>DocumentLibraryForm</Edit>
+  <New>DocumentLibraryForm</New>
+</FormTemplates>
+</file>
+
+<file path=customXml/item3.xml><?xml version="1.0" encoding="utf-8"?>
 <ct:contentTypeSchema xmlns:ct="http://schemas.microsoft.com/office/2006/metadata/contentType" xmlns:ma="http://schemas.microsoft.com/office/2006/metadata/properties/metaAttributes" ct:_="" ma:_="" ma:contentTypeName="Document" ma:contentTypeID="0x010100517047E92E752444B1A1A5B6762093D7" ma:contentTypeVersion="15" ma:contentTypeDescription="Create a new document." ma:contentTypeScope="" ma:versionID="f159efe0c45ecc7ccece10a6674a7830">
   <xsd:schema xmlns:xsd="http://www.w3.org/2001/XMLSchema" xmlns:xs="http://www.w3.org/2001/XMLSchema" xmlns:p="http://schemas.microsoft.com/office/2006/metadata/properties" xmlns:ns2="938f2e1f-609f-4017-a9a2-d54cf4ee6b3b" xmlns:ns3="fa2145f4-c689-44be-8a05-a20dc84ec0fc" targetNamespace="http://schemas.microsoft.com/office/2006/metadata/properties" ma:root="true" ma:fieldsID="0aab26d4d3b06b8d0565ee331a57a8de" ns2:_="" ns3:_="">
     <xsd:import namespace="938f2e1f-609f-4017-a9a2-d54cf4ee6b3b"/>
@@ -27685,28 +28066,32 @@
 </ct:contentTypeSchema>
 </file>
 
-<file path=customXml/item2.xml><?xml version="1.0" encoding="utf-8"?>
-<?mso-contentType ?>
-<FormTemplates xmlns="http://schemas.microsoft.com/sharepoint/v3/contenttype/forms">
-  <Display>DocumentLibraryForm</Display>
-  <Edit>DocumentLibraryForm</Edit>
-  <New>DocumentLibraryForm</New>
-</FormTemplates>
+<file path=customXml/itemProps1.xml><?xml version="1.0" encoding="utf-8"?>
+<ds:datastoreItem xmlns:ds="http://schemas.openxmlformats.org/officeDocument/2006/customXml" ds:itemID="{E3413AD4-741F-4F1E-8C6B-35B3DB54C670}">
+  <ds:schemaRefs>
+    <ds:schemaRef ds:uri="http://schemas.openxmlformats.org/package/2006/metadata/core-properties"/>
+    <ds:schemaRef ds:uri="938f2e1f-609f-4017-a9a2-d54cf4ee6b3b"/>
+    <ds:schemaRef ds:uri="http://purl.org/dc/dcmitype/"/>
+    <ds:schemaRef ds:uri="http://purl.org/dc/elements/1.1/"/>
+    <ds:schemaRef ds:uri="http://schemas.microsoft.com/office/2006/documentManagement/types"/>
+    <ds:schemaRef ds:uri="http://schemas.microsoft.com/office/2006/metadata/properties"/>
+    <ds:schemaRef ds:uri="http://www.w3.org/XML/1998/namespace"/>
+    <ds:schemaRef ds:uri="http://schemas.microsoft.com/office/infopath/2007/PartnerControls"/>
+    <ds:schemaRef ds:uri="fa2145f4-c689-44be-8a05-a20dc84ec0fc"/>
+    <ds:schemaRef ds:uri="http://purl.org/dc/terms/"/>
+  </ds:schemaRefs>
+</ds:datastoreItem>
 </file>
 
-<file path=customXml/item3.xml><?xml version="1.0" encoding="utf-8"?>
-<p:properties xmlns:p="http://schemas.microsoft.com/office/2006/metadata/properties" xmlns:xsi="http://www.w3.org/2001/XMLSchema-instance" xmlns:pc="http://schemas.microsoft.com/office/infopath/2007/PartnerControls">
-  <documentManagement>
-    <TaxCatchAll xmlns="fa2145f4-c689-44be-8a05-a20dc84ec0fc" xsi:nil="true"/>
-    <lcf76f155ced4ddcb4097134ff3c332f xmlns="938f2e1f-609f-4017-a9a2-d54cf4ee6b3b">
-      <Terms xmlns="http://schemas.microsoft.com/office/infopath/2007/PartnerControls"/>
-    </lcf76f155ced4ddcb4097134ff3c332f>
-    <Category xmlns="938f2e1f-609f-4017-a9a2-d54cf4ee6b3b" xsi:nil="true"/>
-  </documentManagement>
-</p:properties>
+<file path=customXml/itemProps2.xml><?xml version="1.0" encoding="utf-8"?>
+<ds:datastoreItem xmlns:ds="http://schemas.openxmlformats.org/officeDocument/2006/customXml" ds:itemID="{D988DFDA-B011-4311-854D-E822A5838782}">
+  <ds:schemaRefs>
+    <ds:schemaRef ds:uri="http://schemas.microsoft.com/sharepoint/v3/contenttype/forms"/>
+  </ds:schemaRefs>
+</ds:datastoreItem>
 </file>
 
-<file path=customXml/itemProps1.xml><?xml version="1.0" encoding="utf-8"?>
+<file path=customXml/itemProps3.xml><?xml version="1.0" encoding="utf-8"?>
 <ds:datastoreItem xmlns:ds="http://schemas.openxmlformats.org/officeDocument/2006/customXml" ds:itemID="{69DBC891-0CF5-4BD7-B58D-A9A26ABE0D67}">
   <ds:schemaRefs>
     <ds:schemaRef ds:uri="http://schemas.microsoft.com/office/2006/metadata/contentType"/>
@@ -27723,29 +28108,4 @@
     <ds:schemaRef ds:uri="http://schemas.microsoft.com/internal/obd"/>
   </ds:schemaRefs>
 </ds:datastoreItem>
-</file>
-
-<file path=customXml/itemProps2.xml><?xml version="1.0" encoding="utf-8"?>
-<ds:datastoreItem xmlns:ds="http://schemas.openxmlformats.org/officeDocument/2006/customXml" ds:itemID="{D988DFDA-B011-4311-854D-E822A5838782}">
-  <ds:schemaRefs>
-    <ds:schemaRef ds:uri="http://schemas.microsoft.com/sharepoint/v3/contenttype/forms"/>
-  </ds:schemaRefs>
-</ds:datastoreItem>
-</file>
-
-<file path=customXml/itemProps3.xml><?xml version="1.0" encoding="utf-8"?>
-<ds:datastoreItem xmlns:ds="http://schemas.openxmlformats.org/officeDocument/2006/customXml" ds:itemID="{E3413AD4-741F-4F1E-8C6B-35B3DB54C670}">
-  <ds:schemaRefs>
-    <ds:schemaRef ds:uri="http://schemas.openxmlformats.org/package/2006/metadata/core-properties"/>
-    <ds:schemaRef ds:uri="938f2e1f-609f-4017-a9a2-d54cf4ee6b3b"/>
-    <ds:schemaRef ds:uri="http://purl.org/dc/dcmitype/"/>
-    <ds:schemaRef ds:uri="http://purl.org/dc/elements/1.1/"/>
-    <ds:schemaRef ds:uri="http://schemas.microsoft.com/office/2006/documentManagement/types"/>
-    <ds:schemaRef ds:uri="http://schemas.microsoft.com/office/2006/metadata/properties"/>
-    <ds:schemaRef ds:uri="http://www.w3.org/XML/1998/namespace"/>
-    <ds:schemaRef ds:uri="http://schemas.microsoft.com/office/infopath/2007/PartnerControls"/>
-    <ds:schemaRef ds:uri="fa2145f4-c689-44be-8a05-a20dc84ec0fc"/>
-    <ds:schemaRef ds:uri="http://purl.org/dc/terms/"/>
-  </ds:schemaRefs>
-</ds:datastoreItem>
 </file>
</xml_diff>

<commit_message>
Small updates made to AGU presentation based on discussion in research group meeting
</commit_message>
<xml_diff>
--- a/UVM-NRT-RoS/AGU Slides-ROS Events and Precip Phase Partitioning.pptx
+++ b/UVM-NRT-RoS/AGU Slides-ROS Events and Precip Phase Partitioning.pptx
@@ -232,7 +232,7 @@
           <a:p>
             <a:fld id="{9EDFEC3F-CA95-774B-A084-8513D32CF312}" type="datetimeFigureOut">
               <a:rPr lang="en-US" smtClean="0"/>
-              <a:t>12/3/2024</a:t>
+              <a:t>12/5/2024</a:t>
             </a:fld>
             <a:endParaRPr lang="en-US"/>
           </a:p>
@@ -19522,7 +19522,7 @@
               <a:rPr lang="en-US" b="1" dirty="0">
                 <a:latin typeface="Century Gothic" panose="020B0502020202020204" pitchFamily="34" charset="0"/>
               </a:rPr>
-              <a:t>Christian Skalka, Rachael Chertok, Julia Sober. Soheyl Faghir-Hagh, Tian Xia</a:t>
+              <a:t>Christian Skalka, Rachael Chertok, Julia Sober, Soheyl Faghir-Hagh, Tian Xia</a:t>
             </a:r>
           </a:p>
         </p:txBody>
@@ -19839,20 +19839,12 @@
               <a:buChar char="•"/>
             </a:pPr>
             <a:r>
-              <a:rPr lang="en-US" sz="1600" dirty="0"/>
-              <a:t>When performing this in Librosa, a </a:t>
-            </a:r>
-            <a:r>
               <a:rPr lang="en-US" sz="1600" dirty="0">
                 <a:highlight>
                   <a:srgbClr val="00FFFF"/>
                 </a:highlight>
               </a:rPr>
-              <a:t>windowing size </a:t>
-            </a:r>
-            <a:r>
-              <a:rPr lang="en-US" sz="1600" dirty="0"/>
-              <a:t>of 1024 was used</a:t>
+              <a:t>When performing this in Librosa, 1024 points in the FFT were used</a:t>
             </a:r>
           </a:p>
           <a:p>
@@ -19864,20 +19856,12 @@
               <a:buChar char="•"/>
             </a:pPr>
             <a:r>
-              <a:rPr lang="en-US" sz="1600" dirty="0"/>
-              <a:t>When performing with our own function, a </a:t>
-            </a:r>
-            <a:r>
               <a:rPr lang="en-US" sz="1600" dirty="0">
                 <a:highlight>
                   <a:srgbClr val="00FFFF"/>
                 </a:highlight>
               </a:rPr>
-              <a:t>windowing size </a:t>
-            </a:r>
-            <a:r>
-              <a:rPr lang="en-US" sz="1600" dirty="0"/>
-              <a:t>of 256 was used. </a:t>
+              <a:t>When performing with our own function, 256 in the FFT were used. </a:t>
             </a:r>
           </a:p>
           <a:p>
@@ -20146,7 +20130,15 @@
             </a:pPr>
             <a:r>
               <a:rPr lang="en-US" dirty="0"/>
-              <a:t>How to detect rain vs. sleet vs. snow with ground-based sensors?</a:t>
+              <a:t>E.g., </a:t>
+            </a:r>
+            <a:r>
+              <a:rPr lang="en-US" i="1" dirty="0"/>
+              <a:t>Rain on snow </a:t>
+            </a:r>
+            <a:r>
+              <a:rPr lang="en-US" dirty="0"/>
+              <a:t>detection: one of the 23 unsolved problems in hydrology [1]</a:t>
             </a:r>
           </a:p>
           <a:p>
@@ -20156,15 +20148,7 @@
             </a:pPr>
             <a:r>
               <a:rPr lang="en-US" dirty="0"/>
-              <a:t>E.g., </a:t>
-            </a:r>
-            <a:r>
-              <a:rPr lang="en-US" i="1" dirty="0"/>
-              <a:t>Rain on snow </a:t>
-            </a:r>
-            <a:r>
-              <a:rPr lang="en-US" dirty="0"/>
-              <a:t>detection: one of the 23 unsolved problems in hydrology [1]</a:t>
+              <a:t>How to detect rain vs. sleet vs. snow with ground-based sensors?</a:t>
             </a:r>
           </a:p>
           <a:p>
@@ -20457,7 +20441,7 @@
         </p:nvSpPr>
         <p:spPr>
           <a:xfrm>
-            <a:off x="181790" y="1814208"/>
+            <a:off x="181791" y="1415168"/>
             <a:ext cx="7081418" cy="4358745"/>
           </a:xfrm>
         </p:spPr>
@@ -20466,19 +20450,6 @@
             <a:normAutofit/>
           </a:bodyPr>
           <a:lstStyle/>
-          <a:p>
-            <a:pPr marL="285750" indent="-285750">
-              <a:lnSpc>
-                <a:spcPct val="100000"/>
-              </a:lnSpc>
-              <a:buFont typeface="Arial" panose="020B0604020202020204" pitchFamily="34" charset="0"/>
-              <a:buChar char="•"/>
-            </a:pPr>
-            <a:r>
-              <a:rPr lang="en-US" dirty="0"/>
-              <a:t>Phase partitioning can be integrated into a complete snow sensor system (incl. snow depth, temp/rh, others).</a:t>
-            </a:r>
-          </a:p>
           <a:p>
             <a:pPr marL="285750" indent="-285750">
               <a:buFont typeface="Arial" panose="020B0604020202020204" pitchFamily="34" charset="0"/>
@@ -20566,6 +20537,23 @@
               <a:rPr lang="en-US" dirty="0"/>
               <a:t>ensures conservative use of mic.</a:t>
             </a:r>
+            <a:endParaRPr lang="en-US" i="1" dirty="0"/>
+          </a:p>
+          <a:p>
+            <a:pPr marL="285750" indent="-285750">
+              <a:buFont typeface="Arial" panose="020B0604020202020204" pitchFamily="34" charset="0"/>
+              <a:buChar char="•"/>
+            </a:pPr>
+            <a:r>
+              <a:rPr lang="en-US" dirty="0"/>
+              <a:t>Phase partitioning can be integrated into a complete snow sensor system (incl. snow depth, temp/rh, others).</a:t>
+            </a:r>
+          </a:p>
+          <a:p>
+            <a:pPr marL="742950" lvl="1" indent="-285750">
+              <a:buFont typeface="Arial" panose="020B0604020202020204" pitchFamily="34" charset="0"/>
+              <a:buChar char="•"/>
+            </a:pPr>
             <a:endParaRPr lang="en-US" i="1" dirty="0"/>
           </a:p>
         </p:txBody>
@@ -20857,7 +20845,7 @@
         </p:nvSpPr>
         <p:spPr>
           <a:xfrm>
-            <a:off x="3316970" y="2120674"/>
+            <a:off x="3391562" y="2120673"/>
             <a:ext cx="4656667" cy="391160"/>
           </a:xfrm>
           <a:prstGeom prst="roundRect">
@@ -20887,7 +20875,7 @@
             <a:pPr algn="ctr"/>
             <a:r>
               <a:rPr lang="en-US" dirty="0"/>
-              <a:t>.wav file labeled by precipitation type</a:t>
+              <a:t>.wav file</a:t>
             </a:r>
           </a:p>
         </p:txBody>
@@ -21053,8 +21041,8 @@
         </p:nvSpPr>
         <p:spPr>
           <a:xfrm>
-            <a:off x="4730994" y="3056793"/>
-            <a:ext cx="2007177" cy="480333"/>
+            <a:off x="4730994" y="3017767"/>
+            <a:ext cx="2071078" cy="589147"/>
           </a:xfrm>
           <a:prstGeom prst="roundRect">
             <a:avLst/>
@@ -21181,7 +21169,7 @@
             <a:pPr algn="ctr"/>
             <a:r>
               <a:rPr lang="en-US" dirty="0"/>
-              <a:t>Short Time Fourier Transform (STFFT)</a:t>
+              <a:t>Short Time Fourier Transform (STFT)</a:t>
             </a:r>
           </a:p>
         </p:txBody>
@@ -21279,7 +21267,7 @@
             <a:pPr algn="ctr"/>
             <a:r>
               <a:rPr lang="en-US" dirty="0"/>
-              <a:t>Extract features from time domain:</a:t>
+              <a:t>Extract features from time domain</a:t>
             </a:r>
           </a:p>
         </p:txBody>
@@ -21381,7 +21369,7 @@
             <a:pPr algn="ctr"/>
             <a:r>
               <a:rPr lang="en-US" dirty="0"/>
-              <a:t>Extract Features from frequency domain (spectrogram):</a:t>
+              <a:t>Extract Features from frequency domain (spectrogram)</a:t>
             </a:r>
           </a:p>
           <a:p>
@@ -22277,48 +22265,6 @@
           </a:p>
         </p:txBody>
       </p:sp>
-      <p:sp>
-        <p:nvSpPr>
-          <p:cNvPr id="4" name="TextBox 3">
-            <a:extLst>
-              <a:ext uri="{FF2B5EF4-FFF2-40B4-BE49-F238E27FC236}">
-                <a16:creationId xmlns:a16="http://schemas.microsoft.com/office/drawing/2014/main" id="{2DC92F2B-1E4E-1E99-3386-643EDE99B9C2}"/>
-              </a:ext>
-            </a:extLst>
-          </p:cNvPr>
-          <p:cNvSpPr txBox="1"/>
-          <p:nvPr/>
-        </p:nvSpPr>
-        <p:spPr>
-          <a:xfrm>
-            <a:off x="9322905" y="3059668"/>
-            <a:ext cx="3230217" cy="369332"/>
-          </a:xfrm>
-          <a:prstGeom prst="rect">
-            <a:avLst/>
-          </a:prstGeom>
-          <a:noFill/>
-        </p:spPr>
-        <p:txBody>
-          <a:bodyPr wrap="square" rtlCol="0">
-            <a:spAutoFit/>
-          </a:bodyPr>
-          <a:lstStyle/>
-          <a:p>
-            <a:r>
-              <a:rPr lang="en-US" b="1" dirty="0">
-                <a:solidFill>
-                  <a:schemeClr val="bg1"/>
-                </a:solidFill>
-                <a:highlight>
-                  <a:srgbClr val="00FFFF"/>
-                </a:highlight>
-              </a:rPr>
-              <a:t>Insert Image?</a:t>
-            </a:r>
-          </a:p>
-        </p:txBody>
-      </p:sp>
     </p:spTree>
     <p:extLst>
       <p:ext uri="{BB962C8B-B14F-4D97-AF65-F5344CB8AC3E}">
@@ -22365,7 +22311,12 @@
             <p:ph type="body" sz="quarter" idx="13"/>
           </p:nvPr>
         </p:nvSpPr>
-        <p:spPr/>
+        <p:spPr>
+          <a:xfrm>
+            <a:off x="614360" y="1616696"/>
+            <a:ext cx="11073073" cy="1702701"/>
+          </a:xfrm>
+        </p:spPr>
         <p:txBody>
           <a:bodyPr numCol="1">
             <a:normAutofit/>
@@ -22378,27 +22329,7 @@
             </a:pPr>
             <a:r>
               <a:rPr lang="en-US" dirty="0"/>
-              <a:t>Input features to ML models retrieved from synthetic data.</a:t>
-            </a:r>
-          </a:p>
-          <a:p>
-            <a:pPr marL="742950" lvl="1" indent="-285750">
-              <a:buFont typeface="Arial" panose="020B0604020202020204" pitchFamily="34" charset="0"/>
-              <a:buChar char="•"/>
-            </a:pPr>
-            <a:r>
-              <a:rPr lang="en-US" dirty="0"/>
-              <a:t>Rain simulated with large watering can.</a:t>
-            </a:r>
-          </a:p>
-          <a:p>
-            <a:pPr marL="742950" lvl="1" indent="-285750">
-              <a:buFont typeface="Arial" panose="020B0604020202020204" pitchFamily="34" charset="0"/>
-              <a:buChar char="•"/>
-            </a:pPr>
-            <a:r>
-              <a:rPr lang="en-US" dirty="0"/>
-              <a:t>Sleet/hail simulated with poured couscous. </a:t>
+              <a:t>Input features to ML models retrieved  from simulated and real data, using our recording device setup.</a:t>
             </a:r>
           </a:p>
           <a:p>
@@ -22432,10 +22363,12 @@
             <a:endParaRPr lang="en-US" dirty="0"/>
           </a:p>
           <a:p>
-            <a:pPr marL="285750" indent="-285750">
-              <a:buFont typeface="Arial" panose="020B0604020202020204" pitchFamily="34" charset="0"/>
-              <a:buChar char="•"/>
-            </a:pPr>
+            <a:endParaRPr lang="en-US" dirty="0"/>
+          </a:p>
+          <a:p>
+            <a:endParaRPr lang="en-US" dirty="0"/>
+          </a:p>
+          <a:p>
             <a:endParaRPr lang="en-US" dirty="0"/>
           </a:p>
           <a:p>
@@ -22485,10 +22418,10 @@
       </p:sp>
       <p:pic>
         <p:nvPicPr>
-          <p:cNvPr id="14" name="Picture 13">
+          <p:cNvPr id="7" name="Picture 6">
             <a:extLst>
               <a:ext uri="{FF2B5EF4-FFF2-40B4-BE49-F238E27FC236}">
-                <a16:creationId xmlns:a16="http://schemas.microsoft.com/office/drawing/2014/main" id="{59BFC66D-E0E5-0FF1-D1A7-A2C2DA6267CC}"/>
+                <a16:creationId xmlns:a16="http://schemas.microsoft.com/office/drawing/2014/main" id="{C7D9DB80-A2AF-EFDE-4BA3-3D72047D0528}"/>
               </a:ext>
             </a:extLst>
           </p:cNvPr>
@@ -22505,8 +22438,8 @@
         </p:blipFill>
         <p:spPr>
           <a:xfrm>
-            <a:off x="768607" y="3338321"/>
-            <a:ext cx="10156674" cy="1161290"/>
+            <a:off x="848994" y="3112718"/>
+            <a:ext cx="9322140" cy="1360212"/>
           </a:xfrm>
           <a:prstGeom prst="rect">
             <a:avLst/>
@@ -22515,10 +22448,10 @@
       </p:pic>
       <p:pic>
         <p:nvPicPr>
-          <p:cNvPr id="16" name="Picture 15">
+          <p:cNvPr id="9" name="Picture 8">
             <a:extLst>
               <a:ext uri="{FF2B5EF4-FFF2-40B4-BE49-F238E27FC236}">
-                <a16:creationId xmlns:a16="http://schemas.microsoft.com/office/drawing/2014/main" id="{F15D4AC1-B1EB-376D-1C7A-E2F6587B3394}"/>
+                <a16:creationId xmlns:a16="http://schemas.microsoft.com/office/drawing/2014/main" id="{65D68609-0124-9260-EAA7-ECFB63D66E6A}"/>
               </a:ext>
             </a:extLst>
           </p:cNvPr>
@@ -22535,14 +22468,58 @@
         </p:blipFill>
         <p:spPr>
           <a:xfrm>
-            <a:off x="768607" y="4568694"/>
-            <a:ext cx="10156674" cy="976072"/>
+            <a:off x="848993" y="4602453"/>
+            <a:ext cx="9447401" cy="1015596"/>
           </a:xfrm>
           <a:prstGeom prst="rect">
             <a:avLst/>
           </a:prstGeom>
         </p:spPr>
       </p:pic>
+      <p:sp>
+        <p:nvSpPr>
+          <p:cNvPr id="10" name="TextBox 9">
+            <a:extLst>
+              <a:ext uri="{FF2B5EF4-FFF2-40B4-BE49-F238E27FC236}">
+                <a16:creationId xmlns:a16="http://schemas.microsoft.com/office/drawing/2014/main" id="{92827FDB-A526-396A-A6D1-928DCC7564D8}"/>
+              </a:ext>
+            </a:extLst>
+          </p:cNvPr>
+          <p:cNvSpPr txBox="1"/>
+          <p:nvPr/>
+        </p:nvSpPr>
+        <p:spPr>
+          <a:xfrm>
+            <a:off x="848994" y="5709404"/>
+            <a:ext cx="8455069" cy="369332"/>
+          </a:xfrm>
+          <a:prstGeom prst="rect">
+            <a:avLst/>
+          </a:prstGeom>
+          <a:noFill/>
+        </p:spPr>
+        <p:txBody>
+          <a:bodyPr wrap="square" rtlCol="0">
+            <a:spAutoFit/>
+          </a:bodyPr>
+          <a:lstStyle/>
+          <a:p>
+            <a:r>
+              <a:rPr lang="en-US">
+                <a:solidFill>
+                  <a:schemeClr val="bg1"/>
+                </a:solidFill>
+              </a:rPr>
+              <a:t>*Not yet implemented on device</a:t>
+            </a:r>
+            <a:endParaRPr lang="en-US" dirty="0">
+              <a:solidFill>
+                <a:schemeClr val="bg1"/>
+              </a:solidFill>
+            </a:endParaRPr>
+          </a:p>
+        </p:txBody>
+      </p:sp>
     </p:spTree>
     <p:extLst>
       <p:ext uri="{BB962C8B-B14F-4D97-AF65-F5344CB8AC3E}">
@@ -22617,7 +22594,19 @@
             </a:pPr>
             <a:r>
               <a:rPr lang="en-US" dirty="0"/>
-              <a:t>Refining models using real data.</a:t>
+              <a:t>Refining models using real data </a:t>
+            </a:r>
+            <a:r>
+              <a:rPr lang="en-US" dirty="0">
+                <a:highlight>
+                  <a:srgbClr val="00FFFF"/>
+                </a:highlight>
+              </a:rPr>
+              <a:t>(mention deployment?)</a:t>
+            </a:r>
+            <a:r>
+              <a:rPr lang="en-US" dirty="0"/>
+              <a:t>.</a:t>
             </a:r>
           </a:p>
           <a:p>
@@ -22778,31 +22767,6 @@
           <a:chExt cx="0" cy="0"/>
         </a:xfrm>
       </p:grpSpPr>
-      <p:sp>
-        <p:nvSpPr>
-          <p:cNvPr id="2" name="Text Placeholder 1">
-            <a:extLst>
-              <a:ext uri="{FF2B5EF4-FFF2-40B4-BE49-F238E27FC236}">
-                <a16:creationId xmlns:a16="http://schemas.microsoft.com/office/drawing/2014/main" id="{9E119785-A3BB-43B8-F86E-C810F5109058}"/>
-              </a:ext>
-            </a:extLst>
-          </p:cNvPr>
-          <p:cNvSpPr>
-            <a:spLocks noGrp="1"/>
-          </p:cNvSpPr>
-          <p:nvPr>
-            <p:ph type="body" sz="quarter" idx="13"/>
-          </p:nvPr>
-        </p:nvSpPr>
-        <p:spPr/>
-        <p:txBody>
-          <a:bodyPr/>
-          <a:lstStyle/>
-          <a:p>
-            <a:endParaRPr lang="en-US" dirty="0"/>
-          </a:p>
-        </p:txBody>
-      </p:sp>
       <p:sp>
         <p:nvSpPr>
           <p:cNvPr id="3" name="Title 2">
@@ -27806,6 +27770,15 @@
 </file>
 
 <file path=customXml/item1.xml><?xml version="1.0" encoding="utf-8"?>
+<?mso-contentType ?>
+<FormTemplates xmlns="http://schemas.microsoft.com/sharepoint/v3/contenttype/forms">
+  <Display>DocumentLibraryForm</Display>
+  <Edit>DocumentLibraryForm</Edit>
+  <New>DocumentLibraryForm</New>
+</FormTemplates>
+</file>
+
+<file path=customXml/item2.xml><?xml version="1.0" encoding="utf-8"?>
 <p:properties xmlns:p="http://schemas.microsoft.com/office/2006/metadata/properties" xmlns:xsi="http://www.w3.org/2001/XMLSchema-instance" xmlns:pc="http://schemas.microsoft.com/office/infopath/2007/PartnerControls">
   <documentManagement>
     <TaxCatchAll xmlns="fa2145f4-c689-44be-8a05-a20dc84ec0fc" xsi:nil="true"/>
@@ -27815,15 +27788,6 @@
     <Category xmlns="938f2e1f-609f-4017-a9a2-d54cf4ee6b3b" xsi:nil="true"/>
   </documentManagement>
 </p:properties>
-</file>
-
-<file path=customXml/item2.xml><?xml version="1.0" encoding="utf-8"?>
-<?mso-contentType ?>
-<FormTemplates xmlns="http://schemas.microsoft.com/sharepoint/v3/contenttype/forms">
-  <Display>DocumentLibraryForm</Display>
-  <Edit>DocumentLibraryForm</Edit>
-  <New>DocumentLibraryForm</New>
-</FormTemplates>
 </file>
 
 <file path=customXml/item3.xml><?xml version="1.0" encoding="utf-8"?>
@@ -28067,6 +28031,14 @@
 </file>
 
 <file path=customXml/itemProps1.xml><?xml version="1.0" encoding="utf-8"?>
+<ds:datastoreItem xmlns:ds="http://schemas.openxmlformats.org/officeDocument/2006/customXml" ds:itemID="{D988DFDA-B011-4311-854D-E822A5838782}">
+  <ds:schemaRefs>
+    <ds:schemaRef ds:uri="http://schemas.microsoft.com/sharepoint/v3/contenttype/forms"/>
+  </ds:schemaRefs>
+</ds:datastoreItem>
+</file>
+
+<file path=customXml/itemProps2.xml><?xml version="1.0" encoding="utf-8"?>
 <ds:datastoreItem xmlns:ds="http://schemas.openxmlformats.org/officeDocument/2006/customXml" ds:itemID="{E3413AD4-741F-4F1E-8C6B-35B3DB54C670}">
   <ds:schemaRefs>
     <ds:schemaRef ds:uri="http://schemas.openxmlformats.org/package/2006/metadata/core-properties"/>
@@ -28079,14 +28051,6 @@
     <ds:schemaRef ds:uri="http://schemas.microsoft.com/office/infopath/2007/PartnerControls"/>
     <ds:schemaRef ds:uri="fa2145f4-c689-44be-8a05-a20dc84ec0fc"/>
     <ds:schemaRef ds:uri="http://purl.org/dc/terms/"/>
-  </ds:schemaRefs>
-</ds:datastoreItem>
-</file>
-
-<file path=customXml/itemProps2.xml><?xml version="1.0" encoding="utf-8"?>
-<ds:datastoreItem xmlns:ds="http://schemas.openxmlformats.org/officeDocument/2006/customXml" ds:itemID="{D988DFDA-B011-4311-854D-E822A5838782}">
-  <ds:schemaRefs>
-    <ds:schemaRef ds:uri="http://schemas.microsoft.com/sharepoint/v3/contenttype/forms"/>
   </ds:schemaRefs>
 </ds:datastoreItem>
 </file>

</xml_diff>

<commit_message>
Small adjustments made to slides
</commit_message>
<xml_diff>
--- a/UVM-NRT-RoS/AGU Slides-ROS Events and Precip Phase Partitioning.pptx
+++ b/UVM-NRT-RoS/AGU Slides-ROS Events and Precip Phase Partitioning.pptx
@@ -20457,6 +20457,16 @@
             </a:pPr>
             <a:r>
               <a:rPr lang="en-US" dirty="0"/>
+              <a:t>Phase partitioning can be integrated into a complete snow sensor system (incl. snow depth, temp/rh, others).</a:t>
+            </a:r>
+          </a:p>
+          <a:p>
+            <a:pPr marL="285750" indent="-285750">
+              <a:buFont typeface="Arial" panose="020B0604020202020204" pitchFamily="34" charset="0"/>
+              <a:buChar char="•"/>
+            </a:pPr>
+            <a:r>
+              <a:rPr lang="en-US" dirty="0"/>
               <a:t>Precipitation phase detection, summary: </a:t>
             </a:r>
           </a:p>
@@ -20538,16 +20548,6 @@
               <a:t>ensures conservative use of mic.</a:t>
             </a:r>
             <a:endParaRPr lang="en-US" i="1" dirty="0"/>
-          </a:p>
-          <a:p>
-            <a:pPr marL="285750" indent="-285750">
-              <a:buFont typeface="Arial" panose="020B0604020202020204" pitchFamily="34" charset="0"/>
-              <a:buChar char="•"/>
-            </a:pPr>
-            <a:r>
-              <a:rPr lang="en-US" dirty="0"/>
-              <a:t>Phase partitioning can be integrated into a complete snow sensor system (incl. snow depth, temp/rh, others).</a:t>
-            </a:r>
           </a:p>
           <a:p>
             <a:pPr marL="742950" lvl="1" indent="-285750">
@@ -22204,7 +22204,7 @@
             </a:pPr>
             <a:r>
               <a:rPr lang="en-US" dirty="0"/>
-              <a:t>MFCCs: Mel Frequency Cepstral Coefficients.</a:t>
+              <a:t>MFCCs: 13 Mel Frequency Cepstral Coefficients.</a:t>
             </a:r>
           </a:p>
           <a:p>
@@ -22411,7 +22411,7 @@
           <a:p>
             <a:r>
               <a:rPr lang="en-US" dirty="0"/>
-              <a:t>Machine Learning Results with Synthetic Data</a:t>
+              <a:t>Machine Learning Results with Simulated Data</a:t>
             </a:r>
           </a:p>
         </p:txBody>
@@ -22574,7 +22574,7 @@
         </p:spPr>
         <p:txBody>
           <a:bodyPr numCol="1">
-            <a:normAutofit/>
+            <a:normAutofit lnSpcReduction="10000"/>
           </a:bodyPr>
           <a:lstStyle/>
           <a:p>
@@ -22584,17 +22584,7 @@
             </a:pPr>
             <a:r>
               <a:rPr lang="en-US" dirty="0"/>
-              <a:t>Collecting real weather audio (in process).</a:t>
-            </a:r>
-          </a:p>
-          <a:p>
-            <a:pPr marL="285750" indent="-285750">
-              <a:buFont typeface="Arial" panose="020B0604020202020204" pitchFamily="34" charset="0"/>
-              <a:buChar char="•"/>
-            </a:pPr>
-            <a:r>
-              <a:rPr lang="en-US" dirty="0"/>
-              <a:t>Refining models using real data </a:t>
+              <a:t>Collecting real weather audio (in process)</a:t>
             </a:r>
             <a:r>
               <a:rPr lang="en-US" dirty="0">
@@ -22602,11 +22592,21 @@
                   <a:srgbClr val="00FFFF"/>
                 </a:highlight>
               </a:rPr>
-              <a:t>(mention deployment?)</a:t>
+              <a:t> (mention deployment?)</a:t>
             </a:r>
             <a:r>
               <a:rPr lang="en-US" dirty="0"/>
               <a:t>.</a:t>
+            </a:r>
+          </a:p>
+          <a:p>
+            <a:pPr marL="285750" indent="-285750">
+              <a:buFont typeface="Arial" panose="020B0604020202020204" pitchFamily="34" charset="0"/>
+              <a:buChar char="•"/>
+            </a:pPr>
+            <a:r>
+              <a:rPr lang="en-US" dirty="0"/>
+              <a:t>Refining models using real data</a:t>
             </a:r>
           </a:p>
           <a:p>
@@ -22669,6 +22669,23 @@
               <a:rPr lang="en-US" dirty="0"/>
               <a:t>Snow depth, soil moisture, temp/RH.</a:t>
             </a:r>
+          </a:p>
+          <a:p>
+            <a:pPr marL="285750" indent="-285750">
+              <a:buFont typeface="Arial" panose="020B0604020202020204" pitchFamily="34" charset="0"/>
+              <a:buChar char="•"/>
+            </a:pPr>
+            <a:r>
+              <a:rPr lang="en-US" dirty="0">
+                <a:highlight>
+                  <a:srgbClr val="00FFFF"/>
+                </a:highlight>
+              </a:rPr>
+              <a:t>Concluding note?</a:t>
+            </a:r>
+          </a:p>
+          <a:p>
+            <a:endParaRPr lang="en-US" dirty="0"/>
           </a:p>
           <a:p>
             <a:pPr marL="742950" lvl="1" indent="-285750">

</xml_diff>

<commit_message>
Added latest version of AGU slides, presented at the AGU conference
</commit_message>
<xml_diff>
--- a/UVM-NRT-RoS/AGU Slides-ROS Events and Precip Phase Partitioning.pptx
+++ b/UVM-NRT-RoS/AGU Slides-ROS Events and Precip Phase Partitioning.pptx
@@ -5,7 +5,7 @@
     <p:sldMasterId id="2147483648" r:id="rId4"/>
   </p:sldMasterIdLst>
   <p:notesMasterIdLst>
-    <p:notesMasterId r:id="rId16"/>
+    <p:notesMasterId r:id="rId15"/>
   </p:notesMasterIdLst>
   <p:sldIdLst>
     <p:sldId id="257" r:id="rId5"/>
@@ -18,22 +18,21 @@
     <p:sldId id="291" r:id="rId12"/>
     <p:sldId id="292" r:id="rId13"/>
     <p:sldId id="293" r:id="rId14"/>
-    <p:sldId id="294" r:id="rId15"/>
   </p:sldIdLst>
   <p:sldSz cx="12192000" cy="6858000"/>
   <p:notesSz cx="6858000" cy="9144000"/>
   <p:embeddedFontLst>
     <p:embeddedFont>
       <p:font typeface="Century Gothic" panose="020B0502020202020204" pitchFamily="34" charset="0"/>
-      <p:regular r:id="rId17"/>
-      <p:bold r:id="rId18"/>
-      <p:italic r:id="rId19"/>
-      <p:boldItalic r:id="rId20"/>
+      <p:regular r:id="rId16"/>
+      <p:bold r:id="rId17"/>
+      <p:italic r:id="rId18"/>
+      <p:boldItalic r:id="rId19"/>
     </p:embeddedFont>
     <p:embeddedFont>
       <p:font typeface="Poppins Medium" panose="00000600000000000000" pitchFamily="2" charset="0"/>
-      <p:regular r:id="rId21"/>
-      <p:italic r:id="rId22"/>
+      <p:regular r:id="rId20"/>
+      <p:italic r:id="rId21"/>
     </p:embeddedFont>
   </p:embeddedFontLst>
   <p:defaultTextStyle>
@@ -232,7 +231,7 @@
           <a:p>
             <a:fld id="{9EDFEC3F-CA95-774B-A084-8513D32CF312}" type="datetimeFigureOut">
               <a:rPr lang="en-US" smtClean="0"/>
-              <a:t>12/5/2024</a:t>
+              <a:t>12/22/2024</a:t>
             </a:fld>
             <a:endParaRPr lang="en-US"/>
           </a:p>
@@ -543,7 +542,10 @@
           <a:bodyPr/>
           <a:lstStyle/>
           <a:p>
-            <a:endParaRPr lang="en-US" dirty="0"/>
+            <a:r>
+              <a:rPr lang="en-US" dirty="0"/>
+              <a:t>Takeaways from this presentation: we present a low cost, novel way of precipitation phase partitioning in alpine environments, which can also be used for rain on snow detection.</a:t>
+            </a:r>
           </a:p>
         </p:txBody>
       </p:sp>
@@ -627,7 +629,36 @@
           <a:bodyPr/>
           <a:lstStyle/>
           <a:p>
-            <a:endParaRPr lang="en-US" dirty="0"/>
+            <a:r>
+              <a:rPr lang="en-US" dirty="0" err="1"/>
+              <a:t>Precip</a:t>
+            </a:r>
+            <a:r>
+              <a:rPr lang="en-US" dirty="0"/>
+              <a:t> phase partitioning is an important and difficult problem in alpine snow hydrology. We need </a:t>
+            </a:r>
+            <a:r>
+              <a:rPr lang="en-US" dirty="0" err="1"/>
+              <a:t>precip</a:t>
+            </a:r>
+            <a:r>
+              <a:rPr lang="en-US" dirty="0"/>
+              <a:t> phase partitioning to do ROS detection, which is important b/c it’s an unsolved problem in hydrology. Our method is to </a:t>
+            </a:r>
+            <a:r>
+              <a:rPr lang="en-US" dirty="0" err="1"/>
+              <a:t>dtect</a:t>
+            </a:r>
+            <a:r>
+              <a:rPr lang="en-US" dirty="0"/>
+              <a:t> rain vs hail vs snow with ground-based sensors.</a:t>
+            </a:r>
+          </a:p>
+          <a:p>
+            <a:r>
+              <a:rPr lang="en-US" dirty="0"/>
+              <a:t>For example, being able to perform precipitation phase partitioning allows us to also perform rain on snow detection, which is labeled as one of the 23 unsolved problems in hydrology</a:t>
+            </a:r>
           </a:p>
         </p:txBody>
       </p:sp>
@@ -711,6 +742,120 @@
           <a:bodyPr/>
           <a:lstStyle/>
           <a:p>
+            <a:r>
+              <a:rPr lang="en-US" dirty="0"/>
+              <a:t>Here are some photo of our prototype device. Audio data is recorded with a microphone underneath the conical resonation chamber, built at a very steep angle to reduce snow loading. Mic is connected to Arduino device (point to top photo), this is where the audio features are extracted to and </a:t>
+            </a:r>
+            <a:r>
+              <a:rPr lang="en-US" dirty="0" err="1"/>
+              <a:t>sgnal</a:t>
+            </a:r>
+            <a:r>
+              <a:rPr lang="en-US" dirty="0"/>
+              <a:t> processing is performed, … </a:t>
+            </a:r>
+            <a:r>
+              <a:rPr lang="en-US" dirty="0" err="1"/>
+              <a:t>Groumd</a:t>
+            </a:r>
+            <a:r>
+              <a:rPr lang="en-US" dirty="0"/>
+              <a:t> based sensor systems don’t have the bandwidth or power supply to support 24/7 streaming audio data.. Prediction needs to be done on device so that you only need to communicate the classification itself, which is low bandwidth. We can also implement a smart sampling method into algorithm to reduce power usage. Streaming sound data is too costly to ___ via satellite from remote locations. You have low power devices, can’t sustain high bandwidth comms. Last point is more of a side point. (Incidentally, this workflow can also be incorporated with other sensors into a full snow sensing system -&gt; point to device_ (if someone asks about solar radiation sensor, say that was used in a previous project for leaf area index (LAI)-relevant to ablation and accumulation of snow).</a:t>
+            </a:r>
+          </a:p>
+          <a:p>
+            <a:pPr marL="0" marR="0" lvl="0" indent="0" algn="l" defTabSz="914400" rtl="0" eaLnBrk="1" fontAlgn="auto" latinLnBrk="0" hangingPunct="1">
+              <a:lnSpc>
+                <a:spcPct val="100000"/>
+              </a:lnSpc>
+              <a:spcBef>
+                <a:spcPts val="0"/>
+              </a:spcBef>
+              <a:spcAft>
+                <a:spcPts val="0"/>
+              </a:spcAft>
+              <a:buClrTx/>
+              <a:buSzTx/>
+              <a:buFontTx/>
+              <a:buNone/>
+              <a:tabLst/>
+              <a:defRPr/>
+            </a:pPr>
+            <a:r>
+              <a:rPr lang="en-US" dirty="0"/>
+              <a:t>Note: Power and memory usage: Max ~30mA during prediction workflow, 16KB RAM. \</a:t>
+            </a:r>
+          </a:p>
+          <a:p>
+            <a:pPr marL="0" marR="0" lvl="0" indent="0" algn="l" defTabSz="914400" rtl="0" eaLnBrk="1" fontAlgn="auto" latinLnBrk="0" hangingPunct="1">
+              <a:lnSpc>
+                <a:spcPct val="100000"/>
+              </a:lnSpc>
+              <a:spcBef>
+                <a:spcPts val="0"/>
+              </a:spcBef>
+              <a:spcAft>
+                <a:spcPts val="0"/>
+              </a:spcAft>
+              <a:buClrTx/>
+              <a:buSzTx/>
+              <a:buFontTx/>
+              <a:buNone/>
+              <a:tabLst/>
+              <a:defRPr/>
+            </a:pPr>
+            <a:r>
+              <a:rPr lang="en-US" dirty="0"/>
+              <a:t>Feathers are our LoRa module, connected with I2C</a:t>
+            </a:r>
+          </a:p>
+          <a:p>
+            <a:pPr marL="0" marR="0" lvl="0" indent="0" algn="l" defTabSz="914400" rtl="0" eaLnBrk="1" fontAlgn="auto" latinLnBrk="0" hangingPunct="1">
+              <a:lnSpc>
+                <a:spcPct val="100000"/>
+              </a:lnSpc>
+              <a:spcBef>
+                <a:spcPts val="0"/>
+              </a:spcBef>
+              <a:spcAft>
+                <a:spcPts val="0"/>
+              </a:spcAft>
+              <a:buClrTx/>
+              <a:buSzTx/>
+              <a:buFontTx/>
+              <a:buNone/>
+              <a:tabLst/>
+              <a:defRPr/>
+            </a:pPr>
+            <a:r>
+              <a:rPr lang="en-US" dirty="0"/>
+              <a:t>Plan is to keep everything open source. (HW and SW)</a:t>
+            </a:r>
+          </a:p>
+          <a:p>
+            <a:pPr marL="0" marR="0" lvl="0" indent="0" algn="l" defTabSz="914400" rtl="0" eaLnBrk="1" fontAlgn="auto" latinLnBrk="0" hangingPunct="1">
+              <a:lnSpc>
+                <a:spcPct val="100000"/>
+              </a:lnSpc>
+              <a:spcBef>
+                <a:spcPts val="0"/>
+              </a:spcBef>
+              <a:spcAft>
+                <a:spcPts val="0"/>
+              </a:spcAft>
+              <a:buClrTx/>
+              <a:buSzTx/>
+              <a:buFontTx/>
+              <a:buNone/>
+              <a:tabLst/>
+              <a:defRPr/>
+            </a:pPr>
+            <a:r>
+              <a:rPr lang="en-US" dirty="0"/>
+              <a:t>$350-400 total cost for everything in the photo</a:t>
+            </a:r>
+          </a:p>
+          <a:p>
             <a:endParaRPr lang="en-US" dirty="0"/>
           </a:p>
         </p:txBody>
@@ -795,7 +940,444 @@
           <a:bodyPr/>
           <a:lstStyle/>
           <a:p>
+            <a:r>
+              <a:rPr lang="en-US" dirty="0"/>
+              <a:t>Emphasize that this is a flowchart to describe our algorithm. This flowchart describes the program logic/workflow of our algorithm. At the top, describes our smart sampling regime. Make a stronger connection – describes the algorithm of our workflow on device</a:t>
+            </a:r>
+          </a:p>
+          <a:p>
+            <a:r>
+              <a:rPr lang="en-US" dirty="0"/>
+              <a:t>Mic produces a waveform. As is typically the case for audio data, that waveform is split into time and frequency domains of the sound. The wav file is itself in time domain. We extract time domain features directly from the .wav file. We can do an FFT to extract </a:t>
+            </a:r>
+            <a:r>
+              <a:rPr lang="en-US" dirty="0" err="1"/>
+              <a:t>freq</a:t>
+            </a:r>
+            <a:r>
+              <a:rPr lang="en-US" dirty="0"/>
+              <a:t> . Do 2 types of STFT (that’s why MFCCs are</a:t>
+            </a:r>
+          </a:p>
+          <a:p>
             <a:endParaRPr lang="en-US" dirty="0"/>
+          </a:p>
+          <a:p>
+            <a:r>
+              <a:rPr lang="en-US" dirty="0"/>
+              <a:t>*A flowchart that describes our detection algorithm</a:t>
+            </a:r>
+          </a:p>
+        </p:txBody>
+      </p:sp>
+      <p:sp>
+        <p:nvSpPr>
+          <p:cNvPr id="4" name="Slide Number Placeholder 3"/>
+          <p:cNvSpPr>
+            <a:spLocks noGrp="1"/>
+          </p:cNvSpPr>
+          <p:nvPr>
+            <p:ph type="sldNum" sz="quarter" idx="5"/>
+          </p:nvPr>
+        </p:nvSpPr>
+        <p:spPr/>
+        <p:txBody>
+          <a:bodyPr/>
+          <a:lstStyle/>
+          <a:p>
+            <a:fld id="{DFC1B3BD-97C9-6447-9D2B-E183E22BC502}" type="slidenum">
+              <a:rPr lang="en-US" smtClean="0"/>
+              <a:t>4</a:t>
+            </a:fld>
+            <a:endParaRPr lang="en-US"/>
+          </a:p>
+        </p:txBody>
+      </p:sp>
+    </p:spTree>
+    <p:extLst>
+      <p:ext uri="{BB962C8B-B14F-4D97-AF65-F5344CB8AC3E}">
+        <p14:creationId xmlns:p14="http://schemas.microsoft.com/office/powerpoint/2010/main" val="4263005202"/>
+      </p:ext>
+    </p:extLst>
+  </p:cSld>
+  <p:clrMapOvr>
+    <a:masterClrMapping/>
+  </p:clrMapOvr>
+</p:notes>
+</file>
+
+<file path=ppt/notesSlides/notesSlide5.xml><?xml version="1.0" encoding="utf-8"?>
+<p:notes xmlns:a="http://schemas.openxmlformats.org/drawingml/2006/main" xmlns:r="http://schemas.openxmlformats.org/officeDocument/2006/relationships" xmlns:p="http://schemas.openxmlformats.org/presentationml/2006/main">
+  <p:cSld>
+    <p:spTree>
+      <p:nvGrpSpPr>
+        <p:cNvPr id="1" name=""/>
+        <p:cNvGrpSpPr/>
+        <p:nvPr/>
+      </p:nvGrpSpPr>
+      <p:grpSpPr>
+        <a:xfrm>
+          <a:off x="0" y="0"/>
+          <a:ext cx="0" cy="0"/>
+          <a:chOff x="0" y="0"/>
+          <a:chExt cx="0" cy="0"/>
+        </a:xfrm>
+      </p:grpSpPr>
+      <p:sp>
+        <p:nvSpPr>
+          <p:cNvPr id="2" name="Slide Image Placeholder 1"/>
+          <p:cNvSpPr>
+            <a:spLocks noGrp="1" noRot="1" noChangeAspect="1"/>
+          </p:cNvSpPr>
+          <p:nvPr>
+            <p:ph type="sldImg"/>
+          </p:nvPr>
+        </p:nvSpPr>
+        <p:spPr/>
+      </p:sp>
+      <p:sp>
+        <p:nvSpPr>
+          <p:cNvPr id="3" name="Notes Placeholder 2"/>
+          <p:cNvSpPr>
+            <a:spLocks noGrp="1"/>
+          </p:cNvSpPr>
+          <p:nvPr>
+            <p:ph type="body" idx="1"/>
+          </p:nvPr>
+        </p:nvSpPr>
+        <p:spPr/>
+        <p:txBody>
+          <a:bodyPr/>
+          <a:lstStyle/>
+          <a:p>
+            <a:r>
+              <a:rPr lang="en-US" dirty="0"/>
+              <a:t>Models need to fit on embedded devices which – nonvolatile memory – if you turn machine off, stuff won’t be there. RAM is volatile (things will still be on device after it’s turned off), Flash is volatile, disk is nonvolatile. </a:t>
+            </a:r>
+          </a:p>
+          <a:p>
+            <a:r>
+              <a:rPr lang="en-US" dirty="0"/>
+              <a:t>Program can’t be too big to fit on the nonvolatile memory on the machine. You need to have enough RAM. Rules out DL architectures because they’re massive models. </a:t>
+            </a:r>
+          </a:p>
+          <a:p>
+            <a:r>
+              <a:rPr lang="en-US" dirty="0"/>
+              <a:t>Last </a:t>
+            </a:r>
+            <a:r>
+              <a:rPr lang="en-US" dirty="0" err="1"/>
+              <a:t>bulletpoint</a:t>
+            </a:r>
+            <a:r>
+              <a:rPr lang="en-US" dirty="0"/>
+              <a:t> is where you can say, MFCCs are a more direct representation of the time series spectrogram, which is why they’re more computationally expensive. </a:t>
+            </a:r>
+            <a:r>
+              <a:rPr lang="en-US" b="1" dirty="0"/>
+              <a:t>Representation of short term power spectrum of a sound, used in many sound classification tasks.</a:t>
+            </a:r>
+            <a:r>
+              <a:rPr lang="en-US" b="0" dirty="0"/>
+              <a:t> </a:t>
+            </a:r>
+            <a:r>
+              <a:rPr lang="en-US" b="1" dirty="0"/>
+              <a:t>Has the benefit that it’s a more complete representation of the original frequency spectrum, but it is more computationally expensive</a:t>
+            </a:r>
+            <a:r>
+              <a:rPr lang="en-US" b="0" dirty="0"/>
+              <a:t>. Less information loss. The algos we evaluated are known to have smaller footprints and are known effective methods. </a:t>
+            </a:r>
+            <a:r>
+              <a:rPr lang="en-US" b="1" dirty="0"/>
+              <a:t>There other algos have been shown to be effective in previous works and have smaller footprints. LR not converging shows that it’s a nonlinear problem. We identified candidates based on previous work, as well as what could be realistically implemented on device.</a:t>
+            </a:r>
+          </a:p>
+          <a:p>
+            <a:endParaRPr lang="en-US" b="1" dirty="0"/>
+          </a:p>
+          <a:p>
+            <a:r>
+              <a:rPr lang="en-US" b="1" dirty="0"/>
+              <a:t>*When talking about features, mention an example of one temporal and one spectral feature</a:t>
+            </a:r>
+          </a:p>
+        </p:txBody>
+      </p:sp>
+      <p:sp>
+        <p:nvSpPr>
+          <p:cNvPr id="4" name="Slide Number Placeholder 3"/>
+          <p:cNvSpPr>
+            <a:spLocks noGrp="1"/>
+          </p:cNvSpPr>
+          <p:nvPr>
+            <p:ph type="sldNum" sz="quarter" idx="5"/>
+          </p:nvPr>
+        </p:nvSpPr>
+        <p:spPr/>
+        <p:txBody>
+          <a:bodyPr/>
+          <a:lstStyle/>
+          <a:p>
+            <a:fld id="{DFC1B3BD-97C9-6447-9D2B-E183E22BC502}" type="slidenum">
+              <a:rPr lang="en-US" smtClean="0"/>
+              <a:t>5</a:t>
+            </a:fld>
+            <a:endParaRPr lang="en-US"/>
+          </a:p>
+        </p:txBody>
+      </p:sp>
+    </p:spTree>
+    <p:extLst>
+      <p:ext uri="{BB962C8B-B14F-4D97-AF65-F5344CB8AC3E}">
+        <p14:creationId xmlns:p14="http://schemas.microsoft.com/office/powerpoint/2010/main" val="217942568"/>
+      </p:ext>
+    </p:extLst>
+  </p:cSld>
+  <p:clrMapOvr>
+    <a:masterClrMapping/>
+  </p:clrMapOvr>
+</p:notes>
+</file>
+
+<file path=ppt/notesSlides/notesSlide6.xml><?xml version="1.0" encoding="utf-8"?>
+<p:notes xmlns:a="http://schemas.openxmlformats.org/drawingml/2006/main" xmlns:r="http://schemas.openxmlformats.org/officeDocument/2006/relationships" xmlns:p="http://schemas.openxmlformats.org/presentationml/2006/main">
+  <p:cSld>
+    <p:spTree>
+      <p:nvGrpSpPr>
+        <p:cNvPr id="1" name=""/>
+        <p:cNvGrpSpPr/>
+        <p:nvPr/>
+      </p:nvGrpSpPr>
+      <p:grpSpPr>
+        <a:xfrm>
+          <a:off x="0" y="0"/>
+          <a:ext cx="0" cy="0"/>
+          <a:chOff x="0" y="0"/>
+          <a:chExt cx="0" cy="0"/>
+        </a:xfrm>
+      </p:grpSpPr>
+      <p:sp>
+        <p:nvSpPr>
+          <p:cNvPr id="2" name="Slide Image Placeholder 1"/>
+          <p:cNvSpPr>
+            <a:spLocks noGrp="1" noRot="1" noChangeAspect="1"/>
+          </p:cNvSpPr>
+          <p:nvPr>
+            <p:ph type="sldImg"/>
+          </p:nvPr>
+        </p:nvSpPr>
+        <p:spPr/>
+      </p:sp>
+      <p:sp>
+        <p:nvSpPr>
+          <p:cNvPr id="3" name="Notes Placeholder 2"/>
+          <p:cNvSpPr>
+            <a:spLocks noGrp="1"/>
+          </p:cNvSpPr>
+          <p:nvPr>
+            <p:ph type="body" idx="1"/>
+          </p:nvPr>
+        </p:nvSpPr>
+        <p:spPr/>
+        <p:txBody>
+          <a:bodyPr/>
+          <a:lstStyle/>
+          <a:p>
+            <a:r>
+              <a:rPr lang="en-US" dirty="0"/>
+              <a:t>Dataset constructed from simulated and some real data. We simulate using a watering can for rain and couscous for hail, we also have some real rain, and real snow. Computationally expensive to compute MFCCs. If asked: explain that we need to do an STFT to extract MFCCs instead of just an STFT, instead of just an FFT. Then, there are other steps to extract an MFCCs. We’ve found that the major blocking point is the STFT.</a:t>
+            </a:r>
+          </a:p>
+          <a:p>
+            <a:r>
+              <a:rPr lang="en-US" dirty="0"/>
+              <a:t>Here’s our results. Want to focus on our highlighted results because those are the best results. Yellow is most accurate. We haven’t been able to get full modeling workflow with yellow on device and it’s most computationally expensive because we’re computing MFCCs. Pink highlighted is the best accuracy we’re getting.</a:t>
+            </a:r>
+          </a:p>
+          <a:p>
+            <a:r>
+              <a:rPr lang="en-US" dirty="0"/>
+              <a:t>The results I want to focus on here are the best results using MFCCs, and the best results not using MFCCs. Both are good, even though the MFCCs are over 98%, it would still be valuable to possibly not use MFCCs due to the computational overhead involved. [Still working on getting the full workflow with MFCCs working on device.]</a:t>
+            </a:r>
+          </a:p>
+          <a:p>
+            <a:r>
+              <a:rPr lang="en-US" dirty="0"/>
+              <a:t>MFCCs do provide the best accuracy, but require a lot of power. By using features that do not require an STFT, and therefore consume less power, we are able to still achieve almost a 94% accuracy, with much less power.</a:t>
+            </a:r>
+          </a:p>
+        </p:txBody>
+      </p:sp>
+      <p:sp>
+        <p:nvSpPr>
+          <p:cNvPr id="4" name="Slide Number Placeholder 3"/>
+          <p:cNvSpPr>
+            <a:spLocks noGrp="1"/>
+          </p:cNvSpPr>
+          <p:nvPr>
+            <p:ph type="sldNum" sz="quarter" idx="5"/>
+          </p:nvPr>
+        </p:nvSpPr>
+        <p:spPr/>
+        <p:txBody>
+          <a:bodyPr/>
+          <a:lstStyle/>
+          <a:p>
+            <a:fld id="{DFC1B3BD-97C9-6447-9D2B-E183E22BC502}" type="slidenum">
+              <a:rPr lang="en-US" smtClean="0"/>
+              <a:t>6</a:t>
+            </a:fld>
+            <a:endParaRPr lang="en-US"/>
+          </a:p>
+        </p:txBody>
+      </p:sp>
+    </p:spTree>
+    <p:extLst>
+      <p:ext uri="{BB962C8B-B14F-4D97-AF65-F5344CB8AC3E}">
+        <p14:creationId xmlns:p14="http://schemas.microsoft.com/office/powerpoint/2010/main" val="3430430820"/>
+      </p:ext>
+    </p:extLst>
+  </p:cSld>
+  <p:clrMapOvr>
+    <a:masterClrMapping/>
+  </p:clrMapOvr>
+</p:notes>
+</file>
+
+<file path=ppt/notesSlides/notesSlide7.xml><?xml version="1.0" encoding="utf-8"?>
+<p:notes xmlns:a="http://schemas.openxmlformats.org/drawingml/2006/main" xmlns:r="http://schemas.openxmlformats.org/officeDocument/2006/relationships" xmlns:p="http://schemas.openxmlformats.org/presentationml/2006/main">
+  <p:cSld>
+    <p:spTree>
+      <p:nvGrpSpPr>
+        <p:cNvPr id="1" name=""/>
+        <p:cNvGrpSpPr/>
+        <p:nvPr/>
+      </p:nvGrpSpPr>
+      <p:grpSpPr>
+        <a:xfrm>
+          <a:off x="0" y="0"/>
+          <a:ext cx="0" cy="0"/>
+          <a:chOff x="0" y="0"/>
+          <a:chExt cx="0" cy="0"/>
+        </a:xfrm>
+      </p:grpSpPr>
+      <p:sp>
+        <p:nvSpPr>
+          <p:cNvPr id="2" name="Slide Image Placeholder 1"/>
+          <p:cNvSpPr>
+            <a:spLocks noGrp="1" noRot="1" noChangeAspect="1"/>
+          </p:cNvSpPr>
+          <p:nvPr>
+            <p:ph type="sldImg"/>
+          </p:nvPr>
+        </p:nvSpPr>
+        <p:spPr/>
+      </p:sp>
+      <p:sp>
+        <p:nvSpPr>
+          <p:cNvPr id="3" name="Notes Placeholder 2"/>
+          <p:cNvSpPr>
+            <a:spLocks noGrp="1"/>
+          </p:cNvSpPr>
+          <p:nvPr>
+            <p:ph type="body" idx="1"/>
+          </p:nvPr>
+        </p:nvSpPr>
+        <p:spPr/>
+        <p:txBody>
+          <a:bodyPr/>
+          <a:lstStyle/>
+          <a:p>
+            <a:r>
+              <a:rPr lang="en-US" dirty="0"/>
+              <a:t>Device will be connected to a Raspberry Pi, which has </a:t>
+            </a:r>
+            <a:r>
+              <a:rPr lang="en-US" dirty="0" err="1"/>
+              <a:t>wifi</a:t>
+            </a:r>
+            <a:r>
+              <a:rPr lang="en-US" dirty="0"/>
+              <a:t> (as opposed to putting </a:t>
+            </a:r>
+            <a:r>
+              <a:rPr lang="en-US" dirty="0" err="1"/>
+              <a:t>wifi</a:t>
+            </a:r>
+            <a:r>
+              <a:rPr lang="en-US" dirty="0"/>
+              <a:t> on the device or moving the microphone setup to a raspberry pi). Pi is used as </a:t>
+            </a:r>
+            <a:r>
+              <a:rPr lang="en-US" dirty="0" err="1"/>
+              <a:t>wifi</a:t>
+            </a:r>
+            <a:r>
+              <a:rPr lang="en-US" dirty="0"/>
+              <a:t> and the things that we send the results to. Write .wav file to </a:t>
+            </a:r>
+            <a:r>
+              <a:rPr lang="en-US" dirty="0" err="1"/>
+              <a:t>Rpi</a:t>
+            </a:r>
+            <a:r>
+              <a:rPr lang="en-US" dirty="0"/>
+              <a:t>, from </a:t>
+            </a:r>
+            <a:r>
+              <a:rPr lang="en-US" dirty="0" err="1"/>
+              <a:t>Rpi</a:t>
+            </a:r>
+            <a:r>
+              <a:rPr lang="en-US" dirty="0"/>
+              <a:t> can copy the data over the Internet to Silk server.</a:t>
+            </a:r>
+          </a:p>
+          <a:p>
+            <a:r>
+              <a:rPr lang="en-US" dirty="0"/>
+              <a:t>Validate on real data.</a:t>
+            </a:r>
+          </a:p>
+          <a:p>
+            <a:r>
+              <a:rPr lang="en-US" dirty="0"/>
+              <a:t>Eventually, aim to produce at moderate scale, for specific scale for field studies in snow hydrology, but pending funding approval</a:t>
+            </a:r>
+          </a:p>
+          <a:p>
+            <a:r>
+              <a:rPr lang="en-US" dirty="0"/>
+              <a:t>Eventually in 2 deployments of 5. Hub and spoke (star network) design, one connected </a:t>
+            </a:r>
+            <a:r>
+              <a:rPr lang="en-US"/>
+              <a:t>to sat has most power</a:t>
+            </a:r>
+          </a:p>
+          <a:p>
+            <a:endParaRPr lang="en-US" dirty="0"/>
+          </a:p>
+          <a:p>
+            <a:r>
+              <a:rPr lang="en-US" dirty="0"/>
+              <a:t>Immediate next step is to refine our prototype </a:t>
+            </a:r>
+          </a:p>
+          <a:p>
+            <a:r>
+              <a:rPr lang="en-US" dirty="0"/>
+              <a:t>Refine HW, produce at moderate scale (budget is for 10 of these), and use in real snow hydrology settings.</a:t>
+            </a:r>
+          </a:p>
+          <a:p>
+            <a:r>
+              <a:rPr lang="en-US" dirty="0"/>
+              <a:t>2 separate deployments of 5-one in CO, one in VT</a:t>
+            </a:r>
           </a:p>
         </p:txBody>
       </p:sp>
@@ -19761,7 +20343,7 @@
               <a:buChar char="•"/>
             </a:pPr>
             <a:r>
-              <a:rPr lang="en-US" sz="1600" dirty="0"/>
+              <a:rPr lang="en-US" dirty="0"/>
               <a:t>Temporal Features:</a:t>
             </a:r>
           </a:p>
@@ -19774,7 +20356,7 @@
               <a:buChar char="•"/>
             </a:pPr>
             <a:r>
-              <a:rPr lang="en-US" sz="1600" dirty="0"/>
+              <a:rPr lang="en-US" dirty="0"/>
               <a:t>Average Autocorrelation Coefficient*, Average Zero Crossing Rate*, Temporal Entropy, Acoustic Complexity Index</a:t>
             </a:r>
           </a:p>
@@ -19787,7 +20369,7 @@
               <a:buChar char="•"/>
             </a:pPr>
             <a:r>
-              <a:rPr lang="en-US" sz="1600" dirty="0"/>
+              <a:rPr lang="en-US" dirty="0"/>
               <a:t>Spectral Features: </a:t>
             </a:r>
           </a:p>
@@ -19800,7 +20382,7 @@
               <a:buChar char="•"/>
             </a:pPr>
             <a:r>
-              <a:rPr lang="en-US" sz="1600" dirty="0"/>
+              <a:rPr lang="en-US" dirty="0"/>
               <a:t>Spectral Entropy, Spectral Cover Low Frequency Coverage, Spectral Cover Mid Frequency Coverage, Spectral Cover High Frequency Coverage, Spectral Flux, Spectral Centroid, Spectral Spread, Spectral Skewness, Spectral Kurtosis, Spectral Bandwidth, Spectral Flatness, Spectral Rolloff</a:t>
             </a:r>
           </a:p>
@@ -19813,77 +20395,7 @@
               <a:buChar char="•"/>
             </a:pPr>
             <a:r>
-              <a:rPr lang="en-US" sz="1600" dirty="0"/>
-              <a:t>MFCC Details:</a:t>
-            </a:r>
-          </a:p>
-          <a:p>
-            <a:pPr marL="742950" lvl="1" indent="-285750">
-              <a:lnSpc>
-                <a:spcPct val="100000"/>
-              </a:lnSpc>
-              <a:buFont typeface="Arial" panose="020B0604020202020204" pitchFamily="34" charset="0"/>
-              <a:buChar char="•"/>
-            </a:pPr>
-            <a:r>
-              <a:rPr lang="en-US" sz="1600" dirty="0"/>
-              <a:t>13 MFCC coefficients extracted</a:t>
-            </a:r>
-          </a:p>
-          <a:p>
-            <a:pPr marL="742950" lvl="1" indent="-285750">
-              <a:lnSpc>
-                <a:spcPct val="100000"/>
-              </a:lnSpc>
-              <a:buFont typeface="Arial" panose="020B0604020202020204" pitchFamily="34" charset="0"/>
-              <a:buChar char="•"/>
-            </a:pPr>
-            <a:r>
-              <a:rPr lang="en-US" sz="1600" dirty="0">
-                <a:highlight>
-                  <a:srgbClr val="00FFFF"/>
-                </a:highlight>
-              </a:rPr>
-              <a:t>When performing this in Librosa, 1024 points in the FFT were used</a:t>
-            </a:r>
-          </a:p>
-          <a:p>
-            <a:pPr marL="742950" lvl="1" indent="-285750">
-              <a:lnSpc>
-                <a:spcPct val="100000"/>
-              </a:lnSpc>
-              <a:buFont typeface="Arial" panose="020B0604020202020204" pitchFamily="34" charset="0"/>
-              <a:buChar char="•"/>
-            </a:pPr>
-            <a:r>
-              <a:rPr lang="en-US" sz="1600" dirty="0">
-                <a:highlight>
-                  <a:srgbClr val="00FFFF"/>
-                </a:highlight>
-              </a:rPr>
-              <a:t>When performing with our own function, 256 in the FFT were used. </a:t>
-            </a:r>
-          </a:p>
-          <a:p>
-            <a:pPr marL="742950" lvl="1" indent="-285750">
-              <a:lnSpc>
-                <a:spcPct val="100000"/>
-              </a:lnSpc>
-              <a:buFont typeface="Arial" panose="020B0604020202020204" pitchFamily="34" charset="0"/>
-              <a:buChar char="•"/>
-            </a:pPr>
-            <a:endParaRPr lang="en-US" sz="1600" dirty="0"/>
-          </a:p>
-          <a:p>
-            <a:pPr marL="285750" indent="-285750">
-              <a:lnSpc>
-                <a:spcPct val="100000"/>
-              </a:lnSpc>
-              <a:buFont typeface="Arial" panose="020B0604020202020204" pitchFamily="34" charset="0"/>
-              <a:buChar char="•"/>
-            </a:pPr>
-            <a:r>
-              <a:rPr lang="en-US" sz="1600" dirty="0"/>
+              <a:rPr lang="en-US" dirty="0"/>
               <a:t>*For some features, like Autocorrelation Coefficient, many values are outputted for each sample. To cut down on the number of features inputted to the model, we average these values together for each .</a:t>
             </a:r>
           </a:p>
@@ -19926,95 +20438,6 @@
     <p:extLst>
       <p:ext uri="{BB962C8B-B14F-4D97-AF65-F5344CB8AC3E}">
         <p14:creationId xmlns:p14="http://schemas.microsoft.com/office/powerpoint/2010/main" val="851105471"/>
-      </p:ext>
-    </p:extLst>
-  </p:cSld>
-  <p:clrMapOvr>
-    <a:masterClrMapping/>
-  </p:clrMapOvr>
-</p:sld>
-</file>
-
-<file path=ppt/slides/slide11.xml><?xml version="1.0" encoding="utf-8"?>
-<p:sld xmlns:a="http://schemas.openxmlformats.org/drawingml/2006/main" xmlns:r="http://schemas.openxmlformats.org/officeDocument/2006/relationships" xmlns:p="http://schemas.openxmlformats.org/presentationml/2006/main">
-  <p:cSld>
-    <p:spTree>
-      <p:nvGrpSpPr>
-        <p:cNvPr id="1" name=""/>
-        <p:cNvGrpSpPr/>
-        <p:nvPr/>
-      </p:nvGrpSpPr>
-      <p:grpSpPr>
-        <a:xfrm>
-          <a:off x="0" y="0"/>
-          <a:ext cx="0" cy="0"/>
-          <a:chOff x="0" y="0"/>
-          <a:chExt cx="0" cy="0"/>
-        </a:xfrm>
-      </p:grpSpPr>
-      <p:sp>
-        <p:nvSpPr>
-          <p:cNvPr id="2" name="Text Placeholder 1">
-            <a:extLst>
-              <a:ext uri="{FF2B5EF4-FFF2-40B4-BE49-F238E27FC236}">
-                <a16:creationId xmlns:a16="http://schemas.microsoft.com/office/drawing/2014/main" id="{2239DD78-8CEE-F7A9-69AD-5BDCB7FF71F5}"/>
-              </a:ext>
-            </a:extLst>
-          </p:cNvPr>
-          <p:cNvSpPr>
-            <a:spLocks noGrp="1"/>
-          </p:cNvSpPr>
-          <p:nvPr>
-            <p:ph type="body" sz="quarter" idx="13"/>
-          </p:nvPr>
-        </p:nvSpPr>
-        <p:spPr/>
-        <p:txBody>
-          <a:bodyPr/>
-          <a:lstStyle/>
-          <a:p>
-            <a:r>
-              <a:rPr lang="en-US" dirty="0"/>
-              <a:t>Power and memory usage: Max ~30mA during prediction workflow, 16KB RAM. </a:t>
-            </a:r>
-          </a:p>
-          <a:p>
-            <a:endParaRPr lang="en-US" dirty="0"/>
-          </a:p>
-        </p:txBody>
-      </p:sp>
-      <p:sp>
-        <p:nvSpPr>
-          <p:cNvPr id="3" name="Title 2">
-            <a:extLst>
-              <a:ext uri="{FF2B5EF4-FFF2-40B4-BE49-F238E27FC236}">
-                <a16:creationId xmlns:a16="http://schemas.microsoft.com/office/drawing/2014/main" id="{721AB0E1-AC53-8093-1BE4-66300FFB9612}"/>
-              </a:ext>
-            </a:extLst>
-          </p:cNvPr>
-          <p:cNvSpPr>
-            <a:spLocks noGrp="1"/>
-          </p:cNvSpPr>
-          <p:nvPr>
-            <p:ph type="title"/>
-          </p:nvPr>
-        </p:nvSpPr>
-        <p:spPr/>
-        <p:txBody>
-          <a:bodyPr/>
-          <a:lstStyle/>
-          <a:p>
-            <a:r>
-              <a:rPr lang="en-US" dirty="0"/>
-              <a:t>To be added back in? (or removed)</a:t>
-            </a:r>
-          </a:p>
-        </p:txBody>
-      </p:sp>
-    </p:spTree>
-    <p:extLst>
-      <p:ext uri="{BB962C8B-B14F-4D97-AF65-F5344CB8AC3E}">
-        <p14:creationId xmlns:p14="http://schemas.microsoft.com/office/powerpoint/2010/main" val="1235237133"/>
       </p:ext>
     </p:extLst>
   </p:cSld>
@@ -20142,31 +20565,23 @@
             </a:r>
           </a:p>
           <a:p>
+            <a:pPr marL="285750" indent="-285750">
+              <a:buFont typeface="Arial" panose="020B0604020202020204" pitchFamily="34" charset="0"/>
+              <a:buChar char="•"/>
+            </a:pPr>
+            <a:r>
+              <a:rPr lang="en-US" dirty="0"/>
+              <a:t>Our goal: how to detect rain vs. hail vs. snow with ground-based sensors?</a:t>
+            </a:r>
+          </a:p>
+          <a:p>
             <a:pPr marL="742950" lvl="1" indent="-285750">
               <a:buFont typeface="Arial" panose="020B0604020202020204" pitchFamily="34" charset="0"/>
               <a:buChar char="•"/>
             </a:pPr>
             <a:r>
               <a:rPr lang="en-US" dirty="0"/>
-              <a:t>How to detect rain vs. sleet vs. snow with ground-based sensors?</a:t>
-            </a:r>
-          </a:p>
-          <a:p>
-            <a:pPr marL="285750" indent="-285750">
-              <a:buFont typeface="Arial" panose="020B0604020202020204" pitchFamily="34" charset="0"/>
-              <a:buChar char="•"/>
-            </a:pPr>
-            <a:r>
-              <a:rPr lang="en-US" dirty="0"/>
-              <a:t>Existing sensors (e.g., </a:t>
-            </a:r>
-            <a:r>
-              <a:rPr lang="en-US" dirty="0" err="1"/>
-              <a:t>disdrometers</a:t>
-            </a:r>
-            <a:r>
-              <a:rPr lang="en-US" dirty="0"/>
-              <a:t>) are expensive and power-hungry.</a:t>
+              <a:t>Existing sensors (e.g., disdrometers) are expensive and power-hungry.</a:t>
             </a:r>
           </a:p>
           <a:p>
@@ -20457,16 +20872,6 @@
             </a:pPr>
             <a:r>
               <a:rPr lang="en-US" dirty="0"/>
-              <a:t>Phase partitioning can be integrated into a complete snow sensor system (incl. snow depth, temp/rh, others).</a:t>
-            </a:r>
-          </a:p>
-          <a:p>
-            <a:pPr marL="285750" indent="-285750">
-              <a:buFont typeface="Arial" panose="020B0604020202020204" pitchFamily="34" charset="0"/>
-              <a:buChar char="•"/>
-            </a:pPr>
-            <a:r>
-              <a:rPr lang="en-US" dirty="0"/>
               <a:t>Precipitation phase detection, summary: </a:t>
             </a:r>
           </a:p>
@@ -20550,7 +20955,20 @@
             <a:endParaRPr lang="en-US" i="1" dirty="0"/>
           </a:p>
           <a:p>
-            <a:pPr marL="742950" lvl="1" indent="-285750">
+            <a:pPr marL="285750" indent="-285750">
+              <a:lnSpc>
+                <a:spcPct val="100000"/>
+              </a:lnSpc>
+              <a:buFont typeface="Arial" panose="020B0604020202020204" pitchFamily="34" charset="0"/>
+              <a:buChar char="•"/>
+            </a:pPr>
+            <a:r>
+              <a:rPr lang="en-US" dirty="0"/>
+              <a:t>Phase partitioning can be integrated into a complete snow sensor system (incl. snow depth, temp/rh, others).</a:t>
+            </a:r>
+          </a:p>
+          <a:p>
+            <a:pPr marL="285750" indent="-285750">
               <a:buFont typeface="Arial" panose="020B0604020202020204" pitchFamily="34" charset="0"/>
               <a:buChar char="•"/>
             </a:pPr>
@@ -20875,7 +21293,7 @@
             <a:pPr algn="ctr"/>
             <a:r>
               <a:rPr lang="en-US" dirty="0"/>
-              <a:t>.wav file</a:t>
+              <a:t>Time series sound data (.wav file)</a:t>
             </a:r>
           </a:p>
         </p:txBody>
@@ -20894,8 +21312,8 @@
         </p:nvSpPr>
         <p:spPr>
           <a:xfrm rot="2887684">
-            <a:off x="3407219" y="2597069"/>
-            <a:ext cx="197678" cy="346194"/>
+            <a:off x="2898144" y="2286298"/>
+            <a:ext cx="193274" cy="2007429"/>
           </a:xfrm>
           <a:prstGeom prst="downArrow">
             <a:avLst>
@@ -20931,55 +21349,6 @@
       </p:sp>
       <p:sp>
         <p:nvSpPr>
-          <p:cNvPr id="10" name="Rectangle: Rounded Corners 9">
-            <a:extLst>
-              <a:ext uri="{FF2B5EF4-FFF2-40B4-BE49-F238E27FC236}">
-                <a16:creationId xmlns:a16="http://schemas.microsoft.com/office/drawing/2014/main" id="{0DCEE1C6-98CC-A469-F27C-C124EE253E43}"/>
-              </a:ext>
-            </a:extLst>
-          </p:cNvPr>
-          <p:cNvSpPr/>
-          <p:nvPr/>
-        </p:nvSpPr>
-        <p:spPr>
-          <a:xfrm>
-            <a:off x="1705449" y="3058580"/>
-            <a:ext cx="2360714" cy="480332"/>
-          </a:xfrm>
-          <a:prstGeom prst="roundRect">
-            <a:avLst/>
-          </a:prstGeom>
-        </p:spPr>
-        <p:style>
-          <a:lnRef idx="2">
-            <a:schemeClr val="accent1">
-              <a:shade val="15000"/>
-            </a:schemeClr>
-          </a:lnRef>
-          <a:fillRef idx="1">
-            <a:schemeClr val="accent1"/>
-          </a:fillRef>
-          <a:effectRef idx="0">
-            <a:schemeClr val="accent1"/>
-          </a:effectRef>
-          <a:fontRef idx="minor">
-            <a:schemeClr val="lt1"/>
-          </a:fontRef>
-        </p:style>
-        <p:txBody>
-          <a:bodyPr rtlCol="0" anchor="ctr"/>
-          <a:lstStyle/>
-          <a:p>
-            <a:pPr algn="ctr"/>
-            <a:r>
-              <a:rPr lang="en-US" dirty="0"/>
-              <a:t>Audio Signal in Time Domain</a:t>
-            </a:r>
-          </a:p>
-        </p:txBody>
-      </p:sp>
-      <p:sp>
-        <p:nvSpPr>
           <p:cNvPr id="11" name="Arrow: Down 10">
             <a:extLst>
               <a:ext uri="{FF2B5EF4-FFF2-40B4-BE49-F238E27FC236}">
@@ -20991,9 +21360,9 @@
           <p:nvPr/>
         </p:nvSpPr>
         <p:spPr>
-          <a:xfrm>
-            <a:off x="5543733" y="2640133"/>
-            <a:ext cx="190848" cy="334439"/>
+          <a:xfrm rot="19152184">
+            <a:off x="7010780" y="2531118"/>
+            <a:ext cx="146788" cy="417989"/>
           </a:xfrm>
           <a:prstGeom prst="downArrow">
             <a:avLst>
@@ -21041,8 +21410,8 @@
         </p:nvSpPr>
         <p:spPr>
           <a:xfrm>
-            <a:off x="4730994" y="3017767"/>
-            <a:ext cx="2071078" cy="589147"/>
+            <a:off x="6687413" y="3035070"/>
+            <a:ext cx="2371746" cy="589356"/>
           </a:xfrm>
           <a:prstGeom prst="roundRect">
             <a:avLst/>
@@ -21071,155 +21440,8 @@
             <a:pPr algn="ctr"/>
             <a:r>
               <a:rPr lang="en-US" dirty="0"/>
-              <a:t>Fast Fourier Transform (FFT)</a:t>
-            </a:r>
-          </a:p>
-        </p:txBody>
-      </p:sp>
-      <p:sp>
-        <p:nvSpPr>
-          <p:cNvPr id="13" name="Arrow: Down 12">
-            <a:extLst>
-              <a:ext uri="{FF2B5EF4-FFF2-40B4-BE49-F238E27FC236}">
-                <a16:creationId xmlns:a16="http://schemas.microsoft.com/office/drawing/2014/main" id="{C626B56F-3682-A518-1ADB-8E1DE751868F}"/>
-              </a:ext>
-            </a:extLst>
-          </p:cNvPr>
-          <p:cNvSpPr/>
-          <p:nvPr/>
-        </p:nvSpPr>
-        <p:spPr>
-          <a:xfrm rot="19102153">
-            <a:off x="7563678" y="2608440"/>
-            <a:ext cx="194836" cy="350162"/>
-          </a:xfrm>
-          <a:prstGeom prst="downArrow">
-            <a:avLst>
-              <a:gd name="adj1" fmla="val 64475"/>
-              <a:gd name="adj2" fmla="val 52817"/>
-            </a:avLst>
-          </a:prstGeom>
-        </p:spPr>
-        <p:style>
-          <a:lnRef idx="2">
-            <a:schemeClr val="accent1">
-              <a:shade val="15000"/>
-            </a:schemeClr>
-          </a:lnRef>
-          <a:fillRef idx="1">
-            <a:schemeClr val="accent1"/>
-          </a:fillRef>
-          <a:effectRef idx="0">
-            <a:schemeClr val="accent1"/>
-          </a:effectRef>
-          <a:fontRef idx="minor">
-            <a:schemeClr val="lt1"/>
-          </a:fontRef>
-        </p:style>
-        <p:txBody>
-          <a:bodyPr rtlCol="0" anchor="ctr"/>
-          <a:lstStyle/>
-          <a:p>
-            <a:pPr algn="ctr"/>
-            <a:endParaRPr lang="en-US"/>
-          </a:p>
-        </p:txBody>
-      </p:sp>
-      <p:sp>
-        <p:nvSpPr>
-          <p:cNvPr id="14" name="Rectangle: Rounded Corners 13">
-            <a:extLst>
-              <a:ext uri="{FF2B5EF4-FFF2-40B4-BE49-F238E27FC236}">
-                <a16:creationId xmlns:a16="http://schemas.microsoft.com/office/drawing/2014/main" id="{13200711-D733-BEE8-C4B6-4036C245ADB2}"/>
-              </a:ext>
-            </a:extLst>
-          </p:cNvPr>
-          <p:cNvSpPr/>
-          <p:nvPr/>
-        </p:nvSpPr>
-        <p:spPr>
-          <a:xfrm>
-            <a:off x="7145301" y="3005916"/>
-            <a:ext cx="3818467" cy="480333"/>
-          </a:xfrm>
-          <a:prstGeom prst="roundRect">
-            <a:avLst/>
-          </a:prstGeom>
-        </p:spPr>
-        <p:style>
-          <a:lnRef idx="2">
-            <a:schemeClr val="accent1">
-              <a:shade val="15000"/>
-            </a:schemeClr>
-          </a:lnRef>
-          <a:fillRef idx="1">
-            <a:schemeClr val="accent1"/>
-          </a:fillRef>
-          <a:effectRef idx="0">
-            <a:schemeClr val="accent1"/>
-          </a:effectRef>
-          <a:fontRef idx="minor">
-            <a:schemeClr val="lt1"/>
-          </a:fontRef>
-        </p:style>
-        <p:txBody>
-          <a:bodyPr rtlCol="0" anchor="ctr"/>
-          <a:lstStyle/>
-          <a:p>
-            <a:pPr algn="ctr"/>
-            <a:r>
-              <a:rPr lang="en-US" dirty="0"/>
-              <a:t>Short Time Fourier Transform (STFT)</a:t>
-            </a:r>
-          </a:p>
-        </p:txBody>
-      </p:sp>
-      <p:sp>
-        <p:nvSpPr>
-          <p:cNvPr id="15" name="Arrow: Down 14">
-            <a:extLst>
-              <a:ext uri="{FF2B5EF4-FFF2-40B4-BE49-F238E27FC236}">
-                <a16:creationId xmlns:a16="http://schemas.microsoft.com/office/drawing/2014/main" id="{6AAF895A-5920-7025-9250-18136B8A0C1C}"/>
-              </a:ext>
-            </a:extLst>
-          </p:cNvPr>
-          <p:cNvSpPr/>
-          <p:nvPr/>
-        </p:nvSpPr>
-        <p:spPr>
-          <a:xfrm rot="1607746">
-            <a:off x="2591534" y="3657234"/>
-            <a:ext cx="212061" cy="343557"/>
-          </a:xfrm>
-          <a:prstGeom prst="downArrow">
-            <a:avLst>
-              <a:gd name="adj1" fmla="val 50000"/>
-              <a:gd name="adj2" fmla="val 52817"/>
-            </a:avLst>
-          </a:prstGeom>
-        </p:spPr>
-        <p:style>
-          <a:lnRef idx="2">
-            <a:schemeClr val="accent1">
-              <a:shade val="15000"/>
-            </a:schemeClr>
-          </a:lnRef>
-          <a:fillRef idx="1">
-            <a:schemeClr val="accent1"/>
-          </a:fillRef>
-          <a:effectRef idx="0">
-            <a:schemeClr val="accent1"/>
-          </a:effectRef>
-          <a:fontRef idx="minor">
-            <a:schemeClr val="lt1"/>
-          </a:fontRef>
-        </p:style>
-        <p:txBody>
-          <a:bodyPr rtlCol="0" anchor="ctr"/>
-          <a:lstStyle/>
-          <a:p>
-            <a:pPr algn="ctr"/>
-            <a:endParaRPr lang="en-US"/>
+              <a:t>Fast Fourier Transform (FFT / STFT)</a:t>
+            </a:r>
           </a:p>
         </p:txBody>
       </p:sp>
@@ -21267,7 +21489,7 @@
             <a:pPr algn="ctr"/>
             <a:r>
               <a:rPr lang="en-US" dirty="0"/>
-              <a:t>Extract features from time domain</a:t>
+              <a:t>Extract time domain features</a:t>
             </a:r>
           </a:p>
         </p:txBody>
@@ -21286,7 +21508,7 @@
         </p:nvSpPr>
         <p:spPr>
           <a:xfrm>
-            <a:off x="5556026" y="3645940"/>
+            <a:off x="7659054" y="3719916"/>
             <a:ext cx="178557" cy="336984"/>
           </a:xfrm>
           <a:prstGeom prst="downArrow">
@@ -21335,7 +21557,7 @@
         </p:nvSpPr>
         <p:spPr>
           <a:xfrm>
-            <a:off x="4095346" y="4059031"/>
+            <a:off x="6268068" y="4089701"/>
             <a:ext cx="3560322" cy="589357"/>
           </a:xfrm>
           <a:prstGeom prst="roundRect">
@@ -21369,159 +21591,12 @@
             <a:pPr algn="ctr"/>
             <a:r>
               <a:rPr lang="en-US" dirty="0"/>
-              <a:t>Extract Features from frequency domain (spectrogram)</a:t>
+              <a:t>Extract frequency domain (spectrogram) features</a:t>
             </a:r>
           </a:p>
           <a:p>
             <a:pPr algn="ctr"/>
             <a:endParaRPr lang="en-US" sz="1400" dirty="0"/>
-          </a:p>
-        </p:txBody>
-      </p:sp>
-      <p:sp>
-        <p:nvSpPr>
-          <p:cNvPr id="19" name="Arrow: Down 18">
-            <a:extLst>
-              <a:ext uri="{FF2B5EF4-FFF2-40B4-BE49-F238E27FC236}">
-                <a16:creationId xmlns:a16="http://schemas.microsoft.com/office/drawing/2014/main" id="{06526750-08A3-F2DA-8BE0-1EE8F78CFC99}"/>
-              </a:ext>
-            </a:extLst>
-          </p:cNvPr>
-          <p:cNvSpPr/>
-          <p:nvPr/>
-        </p:nvSpPr>
-        <p:spPr>
-          <a:xfrm rot="2167071">
-            <a:off x="8793818" y="3623945"/>
-            <a:ext cx="178558" cy="336984"/>
-          </a:xfrm>
-          <a:prstGeom prst="downArrow">
-            <a:avLst>
-              <a:gd name="adj1" fmla="val 50000"/>
-              <a:gd name="adj2" fmla="val 52817"/>
-            </a:avLst>
-          </a:prstGeom>
-        </p:spPr>
-        <p:style>
-          <a:lnRef idx="2">
-            <a:schemeClr val="accent1">
-              <a:shade val="15000"/>
-            </a:schemeClr>
-          </a:lnRef>
-          <a:fillRef idx="1">
-            <a:schemeClr val="accent1"/>
-          </a:fillRef>
-          <a:effectRef idx="0">
-            <a:schemeClr val="accent1"/>
-          </a:effectRef>
-          <a:fontRef idx="minor">
-            <a:schemeClr val="lt1"/>
-          </a:fontRef>
-        </p:style>
-        <p:txBody>
-          <a:bodyPr rtlCol="0" anchor="ctr"/>
-          <a:lstStyle/>
-          <a:p>
-            <a:pPr algn="ctr"/>
-            <a:endParaRPr lang="en-US"/>
-          </a:p>
-        </p:txBody>
-      </p:sp>
-      <p:sp>
-        <p:nvSpPr>
-          <p:cNvPr id="20" name="Rectangle: Rounded Corners 19">
-            <a:extLst>
-              <a:ext uri="{FF2B5EF4-FFF2-40B4-BE49-F238E27FC236}">
-                <a16:creationId xmlns:a16="http://schemas.microsoft.com/office/drawing/2014/main" id="{5CD65FEC-8274-8579-AA67-1108FC6DD196}"/>
-              </a:ext>
-            </a:extLst>
-          </p:cNvPr>
-          <p:cNvSpPr/>
-          <p:nvPr/>
-        </p:nvSpPr>
-        <p:spPr>
-          <a:xfrm>
-            <a:off x="7850222" y="4036867"/>
-            <a:ext cx="2650177" cy="589734"/>
-          </a:xfrm>
-          <a:prstGeom prst="roundRect">
-            <a:avLst/>
-          </a:prstGeom>
-        </p:spPr>
-        <p:style>
-          <a:lnRef idx="2">
-            <a:schemeClr val="accent1">
-              <a:shade val="15000"/>
-            </a:schemeClr>
-          </a:lnRef>
-          <a:fillRef idx="1">
-            <a:schemeClr val="accent1"/>
-          </a:fillRef>
-          <a:effectRef idx="0">
-            <a:schemeClr val="accent1"/>
-          </a:effectRef>
-          <a:fontRef idx="minor">
-            <a:schemeClr val="lt1"/>
-          </a:fontRef>
-        </p:style>
-        <p:txBody>
-          <a:bodyPr rtlCol="0" anchor="ctr"/>
-          <a:lstStyle/>
-          <a:p>
-            <a:pPr algn="ctr"/>
-            <a:r>
-              <a:rPr lang="en-US" dirty="0"/>
-              <a:t>MFCCs</a:t>
-            </a:r>
-          </a:p>
-        </p:txBody>
-      </p:sp>
-      <p:sp>
-        <p:nvSpPr>
-          <p:cNvPr id="21" name="Arrow: Down 20">
-            <a:extLst>
-              <a:ext uri="{FF2B5EF4-FFF2-40B4-BE49-F238E27FC236}">
-                <a16:creationId xmlns:a16="http://schemas.microsoft.com/office/drawing/2014/main" id="{C1C19F90-749B-397B-B291-97612B3F9CEE}"/>
-              </a:ext>
-            </a:extLst>
-          </p:cNvPr>
-          <p:cNvSpPr/>
-          <p:nvPr/>
-        </p:nvSpPr>
-        <p:spPr>
-          <a:xfrm rot="2016982">
-            <a:off x="8155592" y="4657232"/>
-            <a:ext cx="222221" cy="375104"/>
-          </a:xfrm>
-          <a:prstGeom prst="downArrow">
-            <a:avLst>
-              <a:gd name="adj1" fmla="val 50000"/>
-              <a:gd name="adj2" fmla="val 52817"/>
-            </a:avLst>
-          </a:prstGeom>
-        </p:spPr>
-        <p:style>
-          <a:lnRef idx="2">
-            <a:schemeClr val="accent1">
-              <a:shade val="15000"/>
-            </a:schemeClr>
-          </a:lnRef>
-          <a:fillRef idx="1">
-            <a:schemeClr val="accent1"/>
-          </a:fillRef>
-          <a:effectRef idx="0">
-            <a:schemeClr val="accent1"/>
-          </a:effectRef>
-          <a:fontRef idx="minor">
-            <a:schemeClr val="lt1"/>
-          </a:fontRef>
-        </p:style>
-        <p:txBody>
-          <a:bodyPr rtlCol="0" anchor="ctr"/>
-          <a:lstStyle/>
-          <a:p>
-            <a:pPr algn="ctr"/>
-            <a:endParaRPr lang="en-US"/>
           </a:p>
         </p:txBody>
       </p:sp>
@@ -21587,9 +21662,9 @@
           <p:nvPr/>
         </p:nvSpPr>
         <p:spPr>
-          <a:xfrm>
-            <a:off x="5582872" y="4713991"/>
-            <a:ext cx="176707" cy="324852"/>
+          <a:xfrm rot="2873860">
+            <a:off x="7208786" y="4737923"/>
+            <a:ext cx="152058" cy="399964"/>
           </a:xfrm>
           <a:prstGeom prst="downArrow">
             <a:avLst>
@@ -21667,7 +21742,7 @@
             <a:pPr algn="ctr"/>
             <a:r>
               <a:rPr lang="en-US" dirty="0"/>
-              <a:t>Use as input features to ML models: SVM and Random Forests</a:t>
+              <a:t>Use as input features to ML models</a:t>
             </a:r>
           </a:p>
         </p:txBody>
@@ -22062,10 +22137,15 @@
             <p:ph type="body" sz="quarter" idx="13"/>
           </p:nvPr>
         </p:nvSpPr>
-        <p:spPr/>
+        <p:spPr>
+          <a:xfrm>
+            <a:off x="614360" y="1616696"/>
+            <a:ext cx="11073073" cy="4462040"/>
+          </a:xfrm>
+        </p:spPr>
         <p:txBody>
           <a:bodyPr numCol="1">
-            <a:normAutofit/>
+            <a:normAutofit fontScale="92500" lnSpcReduction="10000"/>
           </a:bodyPr>
           <a:lstStyle/>
           <a:p>
@@ -22075,7 +22155,7 @@
             </a:pPr>
             <a:r>
               <a:rPr lang="en-US" dirty="0"/>
-              <a:t>Models must be able to fit on embedded device (nonvolatile and program memory).</a:t>
+              <a:t>Models must be able to fit on embedded device (both for storage and processing).</a:t>
             </a:r>
           </a:p>
           <a:p>
@@ -22184,7 +22264,7 @@
             </a:pPr>
             <a:r>
               <a:rPr lang="en-US" dirty="0"/>
-              <a:t>Time domain: four possible temporal features.</a:t>
+              <a:t>Time domain: four candidate temporal features.</a:t>
             </a:r>
           </a:p>
           <a:p>
@@ -22194,7 +22274,46 @@
             </a:pPr>
             <a:r>
               <a:rPr lang="en-US" dirty="0"/>
-              <a:t>Frequency domain: 12 possible spectral features.</a:t>
+              <a:t>Frequency domain:</a:t>
+            </a:r>
+          </a:p>
+          <a:p>
+            <a:pPr marL="1200150" lvl="2" indent="-285750">
+              <a:buFont typeface="Arial" panose="020B0604020202020204" pitchFamily="34" charset="0"/>
+              <a:buChar char="•"/>
+            </a:pPr>
+            <a:r>
+              <a:rPr lang="en-US" dirty="0">
+                <a:solidFill>
+                  <a:srgbClr val="FF99FF"/>
+                </a:solidFill>
+              </a:rPr>
+              <a:t>From FFT</a:t>
+            </a:r>
+            <a:r>
+              <a:rPr lang="en-US" dirty="0"/>
+              <a:t>: 12 candidate spectral features.</a:t>
+            </a:r>
+          </a:p>
+          <a:p>
+            <a:pPr marL="1200150" lvl="2" indent="-285750">
+              <a:buFont typeface="Arial" panose="020B0604020202020204" pitchFamily="34" charset="0"/>
+              <a:buChar char="•"/>
+            </a:pPr>
+            <a:r>
+              <a:rPr lang="en-US" dirty="0">
+                <a:solidFill>
+                  <a:schemeClr val="accent6">
+                    <a:lumMod val="60000"/>
+                    <a:lumOff val="40000"/>
+                  </a:schemeClr>
+                </a:solidFill>
+              </a:rPr>
+              <a:t>From STFT: </a:t>
+            </a:r>
+            <a:r>
+              <a:rPr lang="en-US" dirty="0"/>
+              <a:t>Candidate 13 Mel Frequency Cepstral Coefficients (MFCCs).</a:t>
             </a:r>
           </a:p>
           <a:p>
@@ -22204,15 +22323,8 @@
             </a:pPr>
             <a:r>
               <a:rPr lang="en-US" dirty="0"/>
-              <a:t>MFCCs: 13 Mel Frequency Cepstral Coefficients.</a:t>
-            </a:r>
-          </a:p>
-          <a:p>
-            <a:pPr marL="742950" lvl="1" indent="-285750">
-              <a:buFont typeface="Arial" panose="020B0604020202020204" pitchFamily="34" charset="0"/>
-              <a:buChar char="•"/>
-            </a:pPr>
-            <a:endParaRPr lang="en-US" dirty="0"/>
+              <a:t>Grid search and other feature selection methods to evaluate candidate features.</a:t>
+            </a:r>
           </a:p>
           <a:p>
             <a:pPr marL="742950" lvl="1" indent="-285750">
@@ -22324,30 +22436,21 @@
           <a:lstStyle/>
           <a:p>
             <a:pPr marL="285750" indent="-285750">
+              <a:lnSpc>
+                <a:spcPct val="100000"/>
+              </a:lnSpc>
               <a:buFont typeface="Arial" panose="020B0604020202020204" pitchFamily="34" charset="0"/>
               <a:buChar char="•"/>
             </a:pPr>
             <a:r>
               <a:rPr lang="en-US" dirty="0"/>
-              <a:t>Input features to ML models retrieved  from simulated and real data, using our recording device setup.</a:t>
-            </a:r>
-          </a:p>
-          <a:p>
-            <a:pPr marL="285750" indent="-285750">
-              <a:buFont typeface="Arial" panose="020B0604020202020204" pitchFamily="34" charset="0"/>
-              <a:buChar char="•"/>
-            </a:pPr>
-            <a:r>
-              <a:rPr lang="en-US" dirty="0"/>
-              <a:t>Current model results, on synthetic data, as follows (in percentages):</a:t>
-            </a:r>
-          </a:p>
-          <a:p>
-            <a:pPr marL="285750" indent="-285750">
-              <a:buFont typeface="Arial" panose="020B0604020202020204" pitchFamily="34" charset="0"/>
-              <a:buChar char="•"/>
-            </a:pPr>
-            <a:endParaRPr lang="en-US" dirty="0"/>
+              <a:t>Input features to ML models retrieved from simulated and real data, using our recording device setup.</a:t>
+            </a:r>
+            <a:endParaRPr lang="en-US" dirty="0">
+              <a:highlight>
+                <a:srgbClr val="00FFFF"/>
+              </a:highlight>
+            </a:endParaRPr>
           </a:p>
           <a:p>
             <a:endParaRPr lang="en-US" dirty="0"/>
@@ -22431,36 +22534,6 @@
           <p:nvPr/>
         </p:nvPicPr>
         <p:blipFill>
-          <a:blip r:embed="rId2"/>
-          <a:stretch>
-            <a:fillRect/>
-          </a:stretch>
-        </p:blipFill>
-        <p:spPr>
-          <a:xfrm>
-            <a:off x="848994" y="3112718"/>
-            <a:ext cx="9322140" cy="1360212"/>
-          </a:xfrm>
-          <a:prstGeom prst="rect">
-            <a:avLst/>
-          </a:prstGeom>
-        </p:spPr>
-      </p:pic>
-      <p:pic>
-        <p:nvPicPr>
-          <p:cNvPr id="9" name="Picture 8">
-            <a:extLst>
-              <a:ext uri="{FF2B5EF4-FFF2-40B4-BE49-F238E27FC236}">
-                <a16:creationId xmlns:a16="http://schemas.microsoft.com/office/drawing/2014/main" id="{65D68609-0124-9260-EAA7-ECFB63D66E6A}"/>
-              </a:ext>
-            </a:extLst>
-          </p:cNvPr>
-          <p:cNvPicPr>
-            <a:picLocks noChangeAspect="1"/>
-          </p:cNvPicPr>
-          <p:nvPr/>
-        </p:nvPicPr>
-        <p:blipFill>
           <a:blip r:embed="rId3"/>
           <a:stretch>
             <a:fillRect/>
@@ -22468,8 +22541,8 @@
         </p:blipFill>
         <p:spPr>
           <a:xfrm>
-            <a:off x="848993" y="4602453"/>
-            <a:ext cx="9447401" cy="1015596"/>
+            <a:off x="848993" y="2534478"/>
+            <a:ext cx="9322140" cy="1360212"/>
           </a:xfrm>
           <a:prstGeom prst="rect">
             <a:avLst/>
@@ -22490,7 +22563,7 @@
         </p:nvSpPr>
         <p:spPr>
           <a:xfrm>
-            <a:off x="848994" y="5709404"/>
+            <a:off x="848993" y="5590134"/>
             <a:ext cx="8455069" cy="369332"/>
           </a:xfrm>
           <a:prstGeom prst="rect">
@@ -22505,21 +22578,46 @@
           <a:lstStyle/>
           <a:p>
             <a:r>
-              <a:rPr lang="en-US">
+              <a:rPr lang="en-US" dirty="0">
                 <a:solidFill>
                   <a:schemeClr val="bg1"/>
                 </a:solidFill>
               </a:rPr>
               <a:t>*Not yet implemented on device</a:t>
             </a:r>
-            <a:endParaRPr lang="en-US" dirty="0">
-              <a:solidFill>
-                <a:schemeClr val="bg1"/>
-              </a:solidFill>
-            </a:endParaRPr>
           </a:p>
         </p:txBody>
       </p:sp>
+      <p:pic>
+        <p:nvPicPr>
+          <p:cNvPr id="5" name="Picture 4">
+            <a:extLst>
+              <a:ext uri="{FF2B5EF4-FFF2-40B4-BE49-F238E27FC236}">
+                <a16:creationId xmlns:a16="http://schemas.microsoft.com/office/drawing/2014/main" id="{75F31D3E-47B5-28A9-36FF-5890054EBA1F}"/>
+              </a:ext>
+            </a:extLst>
+          </p:cNvPr>
+          <p:cNvPicPr>
+            <a:picLocks noChangeAspect="1"/>
+          </p:cNvPicPr>
+          <p:nvPr/>
+        </p:nvPicPr>
+        <p:blipFill>
+          <a:blip r:embed="rId4"/>
+          <a:stretch>
+            <a:fillRect/>
+          </a:stretch>
+        </p:blipFill>
+        <p:spPr>
+          <a:xfrm>
+            <a:off x="848993" y="4015409"/>
+            <a:ext cx="9322140" cy="1323370"/>
+          </a:xfrm>
+          <a:prstGeom prst="rect">
+            <a:avLst/>
+          </a:prstGeom>
+        </p:spPr>
+      </p:pic>
     </p:spTree>
     <p:extLst>
       <p:ext uri="{BB962C8B-B14F-4D97-AF65-F5344CB8AC3E}">
@@ -22586,18 +22684,6 @@
               <a:rPr lang="en-US" dirty="0"/>
               <a:t>Collecting real weather audio (in process)</a:t>
             </a:r>
-            <a:r>
-              <a:rPr lang="en-US" dirty="0">
-                <a:highlight>
-                  <a:srgbClr val="00FFFF"/>
-                </a:highlight>
-              </a:rPr>
-              <a:t> (mention deployment?)</a:t>
-            </a:r>
-            <a:r>
-              <a:rPr lang="en-US" dirty="0"/>
-              <a:t>.</a:t>
-            </a:r>
           </a:p>
           <a:p>
             <a:pPr marL="285750" indent="-285750">
@@ -22676,19 +22762,15 @@
               <a:buChar char="•"/>
             </a:pPr>
             <a:r>
-              <a:rPr lang="en-US" dirty="0">
-                <a:highlight>
-                  <a:srgbClr val="00FFFF"/>
-                </a:highlight>
-              </a:rPr>
-              <a:t>Concluding note?</a:t>
-            </a:r>
-          </a:p>
-          <a:p>
-            <a:endParaRPr lang="en-US" dirty="0"/>
+              <a:rPr lang="en-US" dirty="0"/>
+              <a:t>Thanks to our project team at UVM, the CIROH Consortium, NOAA and USGS</a:t>
+            </a:r>
           </a:p>
           <a:p>
             <a:pPr marL="742950" lvl="1" indent="-285750">
+              <a:lnSpc>
+                <a:spcPct val="110000"/>
+              </a:lnSpc>
               <a:buFont typeface="Arial" panose="020B0604020202020204" pitchFamily="34" charset="0"/>
               <a:buChar char="•"/>
             </a:pPr>
@@ -27787,15 +27869,6 @@
 </file>
 
 <file path=customXml/item1.xml><?xml version="1.0" encoding="utf-8"?>
-<?mso-contentType ?>
-<FormTemplates xmlns="http://schemas.microsoft.com/sharepoint/v3/contenttype/forms">
-  <Display>DocumentLibraryForm</Display>
-  <Edit>DocumentLibraryForm</Edit>
-  <New>DocumentLibraryForm</New>
-</FormTemplates>
-</file>
-
-<file path=customXml/item2.xml><?xml version="1.0" encoding="utf-8"?>
 <p:properties xmlns:p="http://schemas.microsoft.com/office/2006/metadata/properties" xmlns:xsi="http://www.w3.org/2001/XMLSchema-instance" xmlns:pc="http://schemas.microsoft.com/office/infopath/2007/PartnerControls">
   <documentManagement>
     <TaxCatchAll xmlns="fa2145f4-c689-44be-8a05-a20dc84ec0fc" xsi:nil="true"/>
@@ -27805,6 +27878,15 @@
     <Category xmlns="938f2e1f-609f-4017-a9a2-d54cf4ee6b3b" xsi:nil="true"/>
   </documentManagement>
 </p:properties>
+</file>
+
+<file path=customXml/item2.xml><?xml version="1.0" encoding="utf-8"?>
+<?mso-contentType ?>
+<FormTemplates xmlns="http://schemas.microsoft.com/sharepoint/v3/contenttype/forms">
+  <Display>DocumentLibraryForm</Display>
+  <Edit>DocumentLibraryForm</Edit>
+  <New>DocumentLibraryForm</New>
+</FormTemplates>
 </file>
 
 <file path=customXml/item3.xml><?xml version="1.0" encoding="utf-8"?>
@@ -28048,14 +28130,6 @@
 </file>
 
 <file path=customXml/itemProps1.xml><?xml version="1.0" encoding="utf-8"?>
-<ds:datastoreItem xmlns:ds="http://schemas.openxmlformats.org/officeDocument/2006/customXml" ds:itemID="{D988DFDA-B011-4311-854D-E822A5838782}">
-  <ds:schemaRefs>
-    <ds:schemaRef ds:uri="http://schemas.microsoft.com/sharepoint/v3/contenttype/forms"/>
-  </ds:schemaRefs>
-</ds:datastoreItem>
-</file>
-
-<file path=customXml/itemProps2.xml><?xml version="1.0" encoding="utf-8"?>
 <ds:datastoreItem xmlns:ds="http://schemas.openxmlformats.org/officeDocument/2006/customXml" ds:itemID="{E3413AD4-741F-4F1E-8C6B-35B3DB54C670}">
   <ds:schemaRefs>
     <ds:schemaRef ds:uri="http://schemas.openxmlformats.org/package/2006/metadata/core-properties"/>
@@ -28068,6 +28142,14 @@
     <ds:schemaRef ds:uri="http://schemas.microsoft.com/office/infopath/2007/PartnerControls"/>
     <ds:schemaRef ds:uri="fa2145f4-c689-44be-8a05-a20dc84ec0fc"/>
     <ds:schemaRef ds:uri="http://purl.org/dc/terms/"/>
+  </ds:schemaRefs>
+</ds:datastoreItem>
+</file>
+
+<file path=customXml/itemProps2.xml><?xml version="1.0" encoding="utf-8"?>
+<ds:datastoreItem xmlns:ds="http://schemas.openxmlformats.org/officeDocument/2006/customXml" ds:itemID="{D988DFDA-B011-4311-854D-E822A5838782}">
+  <ds:schemaRefs>
+    <ds:schemaRef ds:uri="http://schemas.microsoft.com/sharepoint/v3/contenttype/forms"/>
   </ds:schemaRefs>
 </ds:datastoreItem>
 </file>

</xml_diff>